<commit_message>
Worked on Data Science Group Deck - Finished Presentation
</commit_message>
<xml_diff>
--- a/Insurance_Case_Study_Results_SVA.pptx
+++ b/Insurance_Case_Study_Results_SVA.pptx
@@ -5,10 +5,10 @@
     <p:sldMasterId id="2147483660" r:id="rId4"/>
   </p:sldMasterIdLst>
   <p:notesMasterIdLst>
-    <p:notesMasterId r:id="rId38"/>
+    <p:notesMasterId r:id="rId46"/>
   </p:notesMasterIdLst>
   <p:handoutMasterIdLst>
-    <p:handoutMasterId r:id="rId39"/>
+    <p:handoutMasterId r:id="rId47"/>
   </p:handoutMasterIdLst>
   <p:sldIdLst>
     <p:sldId id="257" r:id="rId5"/>
@@ -29,21 +29,29 @@
     <p:sldId id="278" r:id="rId20"/>
     <p:sldId id="279" r:id="rId21"/>
     <p:sldId id="258" r:id="rId22"/>
-    <p:sldId id="263" r:id="rId23"/>
-    <p:sldId id="280" r:id="rId24"/>
-    <p:sldId id="281" r:id="rId25"/>
-    <p:sldId id="282" r:id="rId26"/>
-    <p:sldId id="283" r:id="rId27"/>
-    <p:sldId id="284" r:id="rId28"/>
-    <p:sldId id="285" r:id="rId29"/>
-    <p:sldId id="286" r:id="rId30"/>
-    <p:sldId id="287" r:id="rId31"/>
-    <p:sldId id="288" r:id="rId32"/>
-    <p:sldId id="289" r:id="rId33"/>
-    <p:sldId id="290" r:id="rId34"/>
-    <p:sldId id="291" r:id="rId35"/>
-    <p:sldId id="292" r:id="rId36"/>
-    <p:sldId id="293" r:id="rId37"/>
+    <p:sldId id="302" r:id="rId23"/>
+    <p:sldId id="263" r:id="rId24"/>
+    <p:sldId id="294" r:id="rId25"/>
+    <p:sldId id="295" r:id="rId26"/>
+    <p:sldId id="297" r:id="rId27"/>
+    <p:sldId id="280" r:id="rId28"/>
+    <p:sldId id="281" r:id="rId29"/>
+    <p:sldId id="282" r:id="rId30"/>
+    <p:sldId id="283" r:id="rId31"/>
+    <p:sldId id="284" r:id="rId32"/>
+    <p:sldId id="285" r:id="rId33"/>
+    <p:sldId id="286" r:id="rId34"/>
+    <p:sldId id="287" r:id="rId35"/>
+    <p:sldId id="288" r:id="rId36"/>
+    <p:sldId id="289" r:id="rId37"/>
+    <p:sldId id="290" r:id="rId38"/>
+    <p:sldId id="291" r:id="rId39"/>
+    <p:sldId id="292" r:id="rId40"/>
+    <p:sldId id="298" r:id="rId41"/>
+    <p:sldId id="299" r:id="rId42"/>
+    <p:sldId id="300" r:id="rId43"/>
+    <p:sldId id="293" r:id="rId44"/>
+    <p:sldId id="301" r:id="rId45"/>
   </p:sldIdLst>
   <p:sldSz cx="12192000" cy="6858000"/>
   <p:notesSz cx="6858000" cy="9144000"/>
@@ -156,7 +164,7 @@
 <file path=ppt/revisionInfo.xml><?xml version="1.0" encoding="utf-8"?>
 <p1510:revInfo xmlns:a="http://schemas.openxmlformats.org/drawingml/2006/main" xmlns:r="http://schemas.openxmlformats.org/officeDocument/2006/relationships" xmlns:p1510="http://schemas.microsoft.com/office/powerpoint/2015/10/main">
   <p1510:revLst>
-    <p1510:client id="{A0CD336C-AD28-4552-9F36-59B3F770B0F0}" v="8" dt="2022-09-10T20:02:54.915"/>
+    <p1510:client id="{A0CD336C-AD28-4552-9F36-59B3F770B0F0}" v="24" dt="2022-09-11T17:47:13.917"/>
   </p1510:revLst>
 </p1510:revInfo>
 </file>
@@ -166,7 +174,7 @@
   <pc:docChgLst>
     <pc:chgData name="Suhita Acharya" userId="043aa87a21745673" providerId="LiveId" clId="{A0CD336C-AD28-4552-9F36-59B3F770B0F0}"/>
     <pc:docChg chg="custSel addSld delSld modSld sldOrd">
-      <pc:chgData name="Suhita Acharya" userId="043aa87a21745673" providerId="LiveId" clId="{A0CD336C-AD28-4552-9F36-59B3F770B0F0}" dt="2022-09-10T20:02:54.915" v="1956"/>
+      <pc:chgData name="Suhita Acharya" userId="043aa87a21745673" providerId="LiveId" clId="{A0CD336C-AD28-4552-9F36-59B3F770B0F0}" dt="2022-09-11T17:59:10.876" v="3081" actId="478"/>
       <pc:docMkLst>
         <pc:docMk/>
       </pc:docMkLst>
@@ -984,6 +992,301 @@
           <pc:sldMk cId="1490446760" sldId="293"/>
         </pc:sldMkLst>
       </pc:sldChg>
+      <pc:sldChg chg="modSp new mod">
+        <pc:chgData name="Suhita Acharya" userId="043aa87a21745673" providerId="LiveId" clId="{A0CD336C-AD28-4552-9F36-59B3F770B0F0}" dt="2022-09-11T16:49:20.449" v="2052" actId="2710"/>
+        <pc:sldMkLst>
+          <pc:docMk/>
+          <pc:sldMk cId="2110200801" sldId="294"/>
+        </pc:sldMkLst>
+        <pc:spChg chg="mod">
+          <ac:chgData name="Suhita Acharya" userId="043aa87a21745673" providerId="LiveId" clId="{A0CD336C-AD28-4552-9F36-59B3F770B0F0}" dt="2022-09-11T16:45:34.897" v="2000" actId="20577"/>
+          <ac:spMkLst>
+            <pc:docMk/>
+            <pc:sldMk cId="2110200801" sldId="294"/>
+            <ac:spMk id="2" creationId="{13432DF8-2346-7132-3534-76394A0D4C66}"/>
+          </ac:spMkLst>
+        </pc:spChg>
+        <pc:spChg chg="mod">
+          <ac:chgData name="Suhita Acharya" userId="043aa87a21745673" providerId="LiveId" clId="{A0CD336C-AD28-4552-9F36-59B3F770B0F0}" dt="2022-09-11T16:49:20.449" v="2052" actId="2710"/>
+          <ac:spMkLst>
+            <pc:docMk/>
+            <pc:sldMk cId="2110200801" sldId="294"/>
+            <ac:spMk id="3" creationId="{107C4BDF-CC6C-A440-CF95-FC7692CB4A29}"/>
+          </ac:spMkLst>
+        </pc:spChg>
+      </pc:sldChg>
+      <pc:sldChg chg="addSp modSp new mod">
+        <pc:chgData name="Suhita Acharya" userId="043aa87a21745673" providerId="LiveId" clId="{A0CD336C-AD28-4552-9F36-59B3F770B0F0}" dt="2022-09-11T17:17:53.129" v="2352" actId="20577"/>
+        <pc:sldMkLst>
+          <pc:docMk/>
+          <pc:sldMk cId="4212388084" sldId="295"/>
+        </pc:sldMkLst>
+        <pc:spChg chg="mod">
+          <ac:chgData name="Suhita Acharya" userId="043aa87a21745673" providerId="LiveId" clId="{A0CD336C-AD28-4552-9F36-59B3F770B0F0}" dt="2022-09-11T17:03:31.174" v="2285" actId="14100"/>
+          <ac:spMkLst>
+            <pc:docMk/>
+            <pc:sldMk cId="4212388084" sldId="295"/>
+            <ac:spMk id="2" creationId="{B75C27B2-5400-2CFE-4E42-30D13889F78D}"/>
+          </ac:spMkLst>
+        </pc:spChg>
+        <pc:spChg chg="mod">
+          <ac:chgData name="Suhita Acharya" userId="043aa87a21745673" providerId="LiveId" clId="{A0CD336C-AD28-4552-9F36-59B3F770B0F0}" dt="2022-09-11T17:17:53.129" v="2352" actId="20577"/>
+          <ac:spMkLst>
+            <pc:docMk/>
+            <pc:sldMk cId="4212388084" sldId="295"/>
+            <ac:spMk id="3" creationId="{EEDCD462-B133-10CC-E29D-7F577E266F20}"/>
+          </ac:spMkLst>
+        </pc:spChg>
+        <pc:picChg chg="add mod">
+          <ac:chgData name="Suhita Acharya" userId="043aa87a21745673" providerId="LiveId" clId="{A0CD336C-AD28-4552-9F36-59B3F770B0F0}" dt="2022-09-11T17:03:37.356" v="2287" actId="14100"/>
+          <ac:picMkLst>
+            <pc:docMk/>
+            <pc:sldMk cId="4212388084" sldId="295"/>
+            <ac:picMk id="5" creationId="{853E6314-C625-74C1-206E-634834C77D26}"/>
+          </ac:picMkLst>
+        </pc:picChg>
+      </pc:sldChg>
+      <pc:sldChg chg="modSp new del mod">
+        <pc:chgData name="Suhita Acharya" userId="043aa87a21745673" providerId="LiveId" clId="{A0CD336C-AD28-4552-9F36-59B3F770B0F0}" dt="2022-09-11T17:30:05.477" v="2443" actId="47"/>
+        <pc:sldMkLst>
+          <pc:docMk/>
+          <pc:sldMk cId="2841004088" sldId="296"/>
+        </pc:sldMkLst>
+        <pc:spChg chg="mod">
+          <ac:chgData name="Suhita Acharya" userId="043aa87a21745673" providerId="LiveId" clId="{A0CD336C-AD28-4552-9F36-59B3F770B0F0}" dt="2022-09-11T17:18:58.994" v="2389" actId="20577"/>
+          <ac:spMkLst>
+            <pc:docMk/>
+            <pc:sldMk cId="2841004088" sldId="296"/>
+            <ac:spMk id="2" creationId="{D737A4AF-9F98-D4F1-2BC8-9E3019607665}"/>
+          </ac:spMkLst>
+        </pc:spChg>
+        <pc:spChg chg="mod">
+          <ac:chgData name="Suhita Acharya" userId="043aa87a21745673" providerId="LiveId" clId="{A0CD336C-AD28-4552-9F36-59B3F770B0F0}" dt="2022-09-11T17:18:43.452" v="2357" actId="14100"/>
+          <ac:spMkLst>
+            <pc:docMk/>
+            <pc:sldMk cId="2841004088" sldId="296"/>
+            <ac:spMk id="3" creationId="{7FF85304-98D0-FCED-943A-BFA7FD06DB54}"/>
+          </ac:spMkLst>
+        </pc:spChg>
+      </pc:sldChg>
+      <pc:sldChg chg="addSp delSp modSp new mod">
+        <pc:chgData name="Suhita Acharya" userId="043aa87a21745673" providerId="LiveId" clId="{A0CD336C-AD28-4552-9F36-59B3F770B0F0}" dt="2022-09-11T17:48:12.053" v="2963" actId="14100"/>
+        <pc:sldMkLst>
+          <pc:docMk/>
+          <pc:sldMk cId="426430643" sldId="297"/>
+        </pc:sldMkLst>
+        <pc:spChg chg="mod">
+          <ac:chgData name="Suhita Acharya" userId="043aa87a21745673" providerId="LiveId" clId="{A0CD336C-AD28-4552-9F36-59B3F770B0F0}" dt="2022-09-11T17:19:56.454" v="2394" actId="14100"/>
+          <ac:spMkLst>
+            <pc:docMk/>
+            <pc:sldMk cId="426430643" sldId="297"/>
+            <ac:spMk id="2" creationId="{AF7FD989-EED0-A8A7-3962-041B413BF2C2}"/>
+          </ac:spMkLst>
+        </pc:spChg>
+        <pc:spChg chg="mod">
+          <ac:chgData name="Suhita Acharya" userId="043aa87a21745673" providerId="LiveId" clId="{A0CD336C-AD28-4552-9F36-59B3F770B0F0}" dt="2022-09-11T17:47:46.218" v="2961"/>
+          <ac:spMkLst>
+            <pc:docMk/>
+            <pc:sldMk cId="426430643" sldId="297"/>
+            <ac:spMk id="3" creationId="{57B70DDF-D61E-7F41-5C4A-868E6030EB46}"/>
+          </ac:spMkLst>
+        </pc:spChg>
+        <pc:spChg chg="mod">
+          <ac:chgData name="Suhita Acharya" userId="043aa87a21745673" providerId="LiveId" clId="{A0CD336C-AD28-4552-9F36-59B3F770B0F0}" dt="2022-09-11T17:48:12.053" v="2963" actId="14100"/>
+          <ac:spMkLst>
+            <pc:docMk/>
+            <pc:sldMk cId="426430643" sldId="297"/>
+            <ac:spMk id="4" creationId="{2C1DC268-F79E-F52F-1FBC-A1F620BD8128}"/>
+          </ac:spMkLst>
+        </pc:spChg>
+        <pc:spChg chg="add del">
+          <ac:chgData name="Suhita Acharya" userId="043aa87a21745673" providerId="LiveId" clId="{A0CD336C-AD28-4552-9F36-59B3F770B0F0}" dt="2022-09-11T17:31:55.166" v="2445"/>
+          <ac:spMkLst>
+            <pc:docMk/>
+            <pc:sldMk cId="426430643" sldId="297"/>
+            <ac:spMk id="5" creationId="{E6B6474F-88FD-8671-DE18-5BB57A5BF433}"/>
+          </ac:spMkLst>
+        </pc:spChg>
+        <pc:spChg chg="add del">
+          <ac:chgData name="Suhita Acharya" userId="043aa87a21745673" providerId="LiveId" clId="{A0CD336C-AD28-4552-9F36-59B3F770B0F0}" dt="2022-09-11T17:45:20.940" v="2924"/>
+          <ac:spMkLst>
+            <pc:docMk/>
+            <pc:sldMk cId="426430643" sldId="297"/>
+            <ac:spMk id="6" creationId="{EF0CEBF1-4FEB-C40B-C097-05923525A780}"/>
+          </ac:spMkLst>
+        </pc:spChg>
+        <pc:spChg chg="add del">
+          <ac:chgData name="Suhita Acharya" userId="043aa87a21745673" providerId="LiveId" clId="{A0CD336C-AD28-4552-9F36-59B3F770B0F0}" dt="2022-09-11T17:46:01.085" v="2939"/>
+          <ac:spMkLst>
+            <pc:docMk/>
+            <pc:sldMk cId="426430643" sldId="297"/>
+            <ac:spMk id="7" creationId="{BA01EBCC-DEB5-4785-2FB6-26859AFD401F}"/>
+          </ac:spMkLst>
+        </pc:spChg>
+        <pc:spChg chg="add del">
+          <ac:chgData name="Suhita Acharya" userId="043aa87a21745673" providerId="LiveId" clId="{A0CD336C-AD28-4552-9F36-59B3F770B0F0}" dt="2022-09-11T17:46:28.997" v="2946"/>
+          <ac:spMkLst>
+            <pc:docMk/>
+            <pc:sldMk cId="426430643" sldId="297"/>
+            <ac:spMk id="8" creationId="{56E2169A-5B17-4247-88F2-8AF4FDE47F35}"/>
+          </ac:spMkLst>
+        </pc:spChg>
+      </pc:sldChg>
+      <pc:sldChg chg="addSp delSp modSp new mod">
+        <pc:chgData name="Suhita Acharya" userId="043aa87a21745673" providerId="LiveId" clId="{A0CD336C-AD28-4552-9F36-59B3F770B0F0}" dt="2022-09-11T17:51:25.479" v="2996" actId="14100"/>
+        <pc:sldMkLst>
+          <pc:docMk/>
+          <pc:sldMk cId="390363813" sldId="298"/>
+        </pc:sldMkLst>
+        <pc:spChg chg="mod">
+          <ac:chgData name="Suhita Acharya" userId="043aa87a21745673" providerId="LiveId" clId="{A0CD336C-AD28-4552-9F36-59B3F770B0F0}" dt="2022-09-11T17:49:21.469" v="2985" actId="14100"/>
+          <ac:spMkLst>
+            <pc:docMk/>
+            <pc:sldMk cId="390363813" sldId="298"/>
+            <ac:spMk id="2" creationId="{EAC04FA7-568E-D2B5-D519-A0D2FC58FC6F}"/>
+          </ac:spMkLst>
+        </pc:spChg>
+        <pc:spChg chg="del mod">
+          <ac:chgData name="Suhita Acharya" userId="043aa87a21745673" providerId="LiveId" clId="{A0CD336C-AD28-4552-9F36-59B3F770B0F0}" dt="2022-09-11T17:50:08.996" v="2988" actId="22"/>
+          <ac:spMkLst>
+            <pc:docMk/>
+            <pc:sldMk cId="390363813" sldId="298"/>
+            <ac:spMk id="3" creationId="{A95DF344-9732-6AEC-F3FA-41E73C8EC511}"/>
+          </ac:spMkLst>
+        </pc:spChg>
+        <pc:picChg chg="add mod ord">
+          <ac:chgData name="Suhita Acharya" userId="043aa87a21745673" providerId="LiveId" clId="{A0CD336C-AD28-4552-9F36-59B3F770B0F0}" dt="2022-09-11T17:51:22.945" v="2995" actId="14100"/>
+          <ac:picMkLst>
+            <pc:docMk/>
+            <pc:sldMk cId="390363813" sldId="298"/>
+            <ac:picMk id="5" creationId="{7033CAB6-D4D8-3744-A0B8-1DF1FDDC3CD3}"/>
+          </ac:picMkLst>
+        </pc:picChg>
+        <pc:picChg chg="add mod">
+          <ac:chgData name="Suhita Acharya" userId="043aa87a21745673" providerId="LiveId" clId="{A0CD336C-AD28-4552-9F36-59B3F770B0F0}" dt="2022-09-11T17:51:25.479" v="2996" actId="14100"/>
+          <ac:picMkLst>
+            <pc:docMk/>
+            <pc:sldMk cId="390363813" sldId="298"/>
+            <ac:picMk id="7" creationId="{A9B4F161-9361-819C-FA02-6F6B89DEAC04}"/>
+          </ac:picMkLst>
+        </pc:picChg>
+      </pc:sldChg>
+      <pc:sldChg chg="addSp delSp modSp new mod">
+        <pc:chgData name="Suhita Acharya" userId="043aa87a21745673" providerId="LiveId" clId="{A0CD336C-AD28-4552-9F36-59B3F770B0F0}" dt="2022-09-11T17:54:53.802" v="3011" actId="14100"/>
+        <pc:sldMkLst>
+          <pc:docMk/>
+          <pc:sldMk cId="4146596824" sldId="299"/>
+        </pc:sldMkLst>
+        <pc:spChg chg="mod">
+          <ac:chgData name="Suhita Acharya" userId="043aa87a21745673" providerId="LiveId" clId="{A0CD336C-AD28-4552-9F36-59B3F770B0F0}" dt="2022-09-11T17:53:17.419" v="3006"/>
+          <ac:spMkLst>
+            <pc:docMk/>
+            <pc:sldMk cId="4146596824" sldId="299"/>
+            <ac:spMk id="2" creationId="{E066C3B8-9836-08DE-B4C0-D5E87B4831B3}"/>
+          </ac:spMkLst>
+        </pc:spChg>
+        <pc:spChg chg="del mod">
+          <ac:chgData name="Suhita Acharya" userId="043aa87a21745673" providerId="LiveId" clId="{A0CD336C-AD28-4552-9F36-59B3F770B0F0}" dt="2022-09-11T17:53:01.078" v="3002" actId="22"/>
+          <ac:spMkLst>
+            <pc:docMk/>
+            <pc:sldMk cId="4146596824" sldId="299"/>
+            <ac:spMk id="3" creationId="{956717B5-9A0A-A0BE-C860-D6B47F474365}"/>
+          </ac:spMkLst>
+        </pc:spChg>
+        <pc:picChg chg="add mod ord">
+          <ac:chgData name="Suhita Acharya" userId="043aa87a21745673" providerId="LiveId" clId="{A0CD336C-AD28-4552-9F36-59B3F770B0F0}" dt="2022-09-11T17:53:19.712" v="3007" actId="14100"/>
+          <ac:picMkLst>
+            <pc:docMk/>
+            <pc:sldMk cId="4146596824" sldId="299"/>
+            <ac:picMk id="5" creationId="{48081990-0C19-13E8-776F-B105CC797E9C}"/>
+          </ac:picMkLst>
+        </pc:picChg>
+        <pc:picChg chg="add mod">
+          <ac:chgData name="Suhita Acharya" userId="043aa87a21745673" providerId="LiveId" clId="{A0CD336C-AD28-4552-9F36-59B3F770B0F0}" dt="2022-09-11T17:54:53.802" v="3011" actId="14100"/>
+          <ac:picMkLst>
+            <pc:docMk/>
+            <pc:sldMk cId="4146596824" sldId="299"/>
+            <ac:picMk id="7" creationId="{7BA8FF47-6B21-B8AF-469A-156A5A0A72C9}"/>
+          </ac:picMkLst>
+        </pc:picChg>
+      </pc:sldChg>
+      <pc:sldChg chg="addSp delSp modSp new mod">
+        <pc:chgData name="Suhita Acharya" userId="043aa87a21745673" providerId="LiveId" clId="{A0CD336C-AD28-4552-9F36-59B3F770B0F0}" dt="2022-09-11T17:57:58.930" v="3055" actId="14100"/>
+        <pc:sldMkLst>
+          <pc:docMk/>
+          <pc:sldMk cId="3972118626" sldId="300"/>
+        </pc:sldMkLst>
+        <pc:spChg chg="mod">
+          <ac:chgData name="Suhita Acharya" userId="043aa87a21745673" providerId="LiveId" clId="{A0CD336C-AD28-4552-9F36-59B3F770B0F0}" dt="2022-09-11T17:56:27.026" v="3051" actId="20577"/>
+          <ac:spMkLst>
+            <pc:docMk/>
+            <pc:sldMk cId="3972118626" sldId="300"/>
+            <ac:spMk id="2" creationId="{66849788-F7F3-8325-402F-CD7A9E398682}"/>
+          </ac:spMkLst>
+        </pc:spChg>
+        <pc:spChg chg="del mod">
+          <ac:chgData name="Suhita Acharya" userId="043aa87a21745673" providerId="LiveId" clId="{A0CD336C-AD28-4552-9F36-59B3F770B0F0}" dt="2022-09-11T17:57:29.798" v="3052" actId="22"/>
+          <ac:spMkLst>
+            <pc:docMk/>
+            <pc:sldMk cId="3972118626" sldId="300"/>
+            <ac:spMk id="3" creationId="{50D3C6C1-24A4-5134-8446-0BDDAB80FE1C}"/>
+          </ac:spMkLst>
+        </pc:spChg>
+        <pc:picChg chg="add mod ord">
+          <ac:chgData name="Suhita Acharya" userId="043aa87a21745673" providerId="LiveId" clId="{A0CD336C-AD28-4552-9F36-59B3F770B0F0}" dt="2022-09-11T17:57:58.930" v="3055" actId="14100"/>
+          <ac:picMkLst>
+            <pc:docMk/>
+            <pc:sldMk cId="3972118626" sldId="300"/>
+            <ac:picMk id="5" creationId="{F2E0AD89-FB60-D9F1-5041-7836F85B975D}"/>
+          </ac:picMkLst>
+        </pc:picChg>
+      </pc:sldChg>
+      <pc:sldChg chg="delSp modSp new mod">
+        <pc:chgData name="Suhita Acharya" userId="043aa87a21745673" providerId="LiveId" clId="{A0CD336C-AD28-4552-9F36-59B3F770B0F0}" dt="2022-09-11T17:59:10.876" v="3081" actId="478"/>
+        <pc:sldMkLst>
+          <pc:docMk/>
+          <pc:sldMk cId="2555217564" sldId="301"/>
+        </pc:sldMkLst>
+        <pc:spChg chg="mod">
+          <ac:chgData name="Suhita Acharya" userId="043aa87a21745673" providerId="LiveId" clId="{A0CD336C-AD28-4552-9F36-59B3F770B0F0}" dt="2022-09-11T17:58:32.149" v="3068" actId="20577"/>
+          <ac:spMkLst>
+            <pc:docMk/>
+            <pc:sldMk cId="2555217564" sldId="301"/>
+            <ac:spMk id="2" creationId="{87BA2D2F-FBD5-E781-588D-584066AE1C6E}"/>
+          </ac:spMkLst>
+        </pc:spChg>
+        <pc:spChg chg="del">
+          <ac:chgData name="Suhita Acharya" userId="043aa87a21745673" providerId="LiveId" clId="{A0CD336C-AD28-4552-9F36-59B3F770B0F0}" dt="2022-09-11T17:59:10.876" v="3081" actId="478"/>
+          <ac:spMkLst>
+            <pc:docMk/>
+            <pc:sldMk cId="2555217564" sldId="301"/>
+            <ac:spMk id="3" creationId="{34E2F943-FE88-9F3D-01B2-283B4E4EFB26}"/>
+          </ac:spMkLst>
+        </pc:spChg>
+      </pc:sldChg>
+      <pc:sldChg chg="delSp modSp new mod">
+        <pc:chgData name="Suhita Acharya" userId="043aa87a21745673" providerId="LiveId" clId="{A0CD336C-AD28-4552-9F36-59B3F770B0F0}" dt="2022-09-11T17:59:04.821" v="3080" actId="478"/>
+        <pc:sldMkLst>
+          <pc:docMk/>
+          <pc:sldMk cId="4012455040" sldId="302"/>
+        </pc:sldMkLst>
+        <pc:spChg chg="mod">
+          <ac:chgData name="Suhita Acharya" userId="043aa87a21745673" providerId="LiveId" clId="{A0CD336C-AD28-4552-9F36-59B3F770B0F0}" dt="2022-09-11T17:58:48.971" v="3079" actId="20577"/>
+          <ac:spMkLst>
+            <pc:docMk/>
+            <pc:sldMk cId="4012455040" sldId="302"/>
+            <ac:spMk id="2" creationId="{FDC54D6C-231C-6F68-455F-2C7D1651C431}"/>
+          </ac:spMkLst>
+        </pc:spChg>
+        <pc:spChg chg="del">
+          <ac:chgData name="Suhita Acharya" userId="043aa87a21745673" providerId="LiveId" clId="{A0CD336C-AD28-4552-9F36-59B3F770B0F0}" dt="2022-09-11T17:59:04.821" v="3080" actId="478"/>
+          <ac:spMkLst>
+            <pc:docMk/>
+            <pc:sldMk cId="4012455040" sldId="302"/>
+            <ac:spMk id="3" creationId="{F2DDDC75-2917-4D4B-ACD6-B3B45B24FC9A}"/>
+          </ac:spMkLst>
+        </pc:spChg>
+      </pc:sldChg>
     </pc:docChg>
   </pc:docChgLst>
 </pc:chgInfo>
@@ -1071,7 +1374,7 @@
           <a:p>
             <a:fld id="{13DC2751-278C-4682-9C3F-0FF7B4FCFAE7}" type="datetimeFigureOut">
               <a:rPr lang="en-US" smtClean="0"/>
-              <a:t>9/10/2022</a:t>
+              <a:t>9/11/2022</a:t>
             </a:fld>
             <a:endParaRPr lang="en-US" dirty="0"/>
           </a:p>
@@ -1236,7 +1539,7 @@
           <a:p>
             <a:fld id="{DDFF0845-D09E-4AF9-9623-EA7EA0297EF3}" type="datetimeFigureOut">
               <a:rPr lang="en-US" smtClean="0"/>
-              <a:t>9/10/2022</a:t>
+              <a:t>9/11/2022</a:t>
             </a:fld>
             <a:endParaRPr lang="en-US" dirty="0"/>
           </a:p>
@@ -1741,7 +2044,7 @@
           <a:p>
             <a:fld id="{D409693A-2307-4FDC-9539-08DC9083DDED}" type="datetime1">
               <a:rPr lang="en-US" smtClean="0"/>
-              <a:t>9/10/2022</a:t>
+              <a:t>9/11/2022</a:t>
             </a:fld>
             <a:endParaRPr lang="en-US" dirty="0"/>
           </a:p>
@@ -1912,7 +2215,7 @@
           <a:p>
             <a:fld id="{A0011EA7-B10E-4739-92FE-8993461CC0B7}" type="datetime1">
               <a:rPr lang="en-US" smtClean="0"/>
-              <a:t>9/10/2022</a:t>
+              <a:t>9/11/2022</a:t>
             </a:fld>
             <a:endParaRPr lang="en-US" dirty="0"/>
           </a:p>
@@ -2093,7 +2396,7 @@
           <a:p>
             <a:fld id="{315DC13F-2D2A-49BA-966D-6530A12E7C15}" type="datetime1">
               <a:rPr lang="en-US" smtClean="0"/>
-              <a:t>9/10/2022</a:t>
+              <a:t>9/11/2022</a:t>
             </a:fld>
             <a:endParaRPr lang="en-US" dirty="0"/>
           </a:p>
@@ -2280,7 +2583,7 @@
           <a:p>
             <a:fld id="{3320E1C1-C26F-4479-A8BD-144B4C139DA5}" type="datetime1">
               <a:rPr lang="en-US" smtClean="0"/>
-              <a:t>9/10/2022</a:t>
+              <a:t>9/11/2022</a:t>
             </a:fld>
             <a:endParaRPr lang="en-US" dirty="0"/>
           </a:p>
@@ -2483,7 +2786,7 @@
           <a:p>
             <a:fld id="{BF519E61-C2D6-49AB-83F2-8FC9FEFBDAFD}" type="datetime1">
               <a:rPr lang="en-US" smtClean="0"/>
-              <a:t>9/10/2022</a:t>
+              <a:t>9/11/2022</a:t>
             </a:fld>
             <a:endParaRPr lang="en-US" dirty="0"/>
           </a:p>
@@ -2804,7 +3107,7 @@
           <a:p>
             <a:fld id="{047BE74F-367A-4D3C-8AA7-FA60CCA05EAE}" type="datetime1">
               <a:rPr lang="en-US" smtClean="0"/>
-              <a:t>9/10/2022</a:t>
+              <a:t>9/11/2022</a:t>
             </a:fld>
             <a:endParaRPr lang="en-US" dirty="0"/>
           </a:p>
@@ -3232,7 +3535,7 @@
           <a:p>
             <a:fld id="{A79E3F9C-6465-4987-8E4E-615CFD4753AA}" type="datetime1">
               <a:rPr lang="en-US" smtClean="0"/>
-              <a:t>9/10/2022</a:t>
+              <a:t>9/11/2022</a:t>
             </a:fld>
             <a:endParaRPr lang="en-US" dirty="0"/>
           </a:p>
@@ -3353,7 +3656,7 @@
           <a:p>
             <a:fld id="{C849EFD6-3C20-43C6-9E75-1A9D48D9576F}" type="datetime1">
               <a:rPr lang="en-US" smtClean="0"/>
-              <a:t>9/10/2022</a:t>
+              <a:t>9/11/2022</a:t>
             </a:fld>
             <a:endParaRPr lang="en-US" dirty="0"/>
           </a:p>
@@ -3451,7 +3754,7 @@
           <a:p>
             <a:fld id="{47493D5A-A484-46EE-9DC8-9A16BFF8327E}" type="datetime1">
               <a:rPr lang="en-US" smtClean="0"/>
-              <a:t>9/10/2022</a:t>
+              <a:t>9/11/2022</a:t>
             </a:fld>
             <a:endParaRPr lang="en-US" dirty="0"/>
           </a:p>
@@ -3731,7 +4034,7 @@
           <a:p>
             <a:fld id="{76287BC8-78D1-4FEB-9D4F-E22E45CC04F7}" type="datetime1">
               <a:rPr lang="en-US" smtClean="0"/>
-              <a:t>9/10/2022</a:t>
+              <a:t>9/11/2022</a:t>
             </a:fld>
             <a:endParaRPr lang="en-US" dirty="0"/>
           </a:p>
@@ -3990,7 +4293,7 @@
           <a:p>
             <a:fld id="{4F568210-870C-4A62-9D1B-4B25162550AB}" type="datetime1">
               <a:rPr lang="en-US" smtClean="0"/>
-              <a:t>9/10/2022</a:t>
+              <a:t>9/11/2022</a:t>
             </a:fld>
             <a:endParaRPr lang="en-US" dirty="0"/>
           </a:p>
@@ -4216,7 +4519,7 @@
           <a:p>
             <a:fld id="{00CABDA2-EB00-4A4D-86B7-63E286A484E5}" type="datetime1">
               <a:rPr lang="en-US" smtClean="0"/>
-              <a:t>9/10/2022</a:t>
+              <a:t>9/11/2022</a:t>
             </a:fld>
             <a:endParaRPr lang="en-US" dirty="0"/>
           </a:p>
@@ -6228,7 +6531,7 @@
           <p:cNvPr id="2" name="Title 1">
             <a:extLst>
               <a:ext uri="{FF2B5EF4-FFF2-40B4-BE49-F238E27FC236}">
-                <a16:creationId xmlns:a16="http://schemas.microsoft.com/office/drawing/2014/main" id="{FBD337FB-C883-6E25-AF2A-E15D79044924}"/>
+                <a16:creationId xmlns:a16="http://schemas.microsoft.com/office/drawing/2014/main" id="{FDC54D6C-231C-6F68-455F-2C7D1651C431}"/>
               </a:ext>
             </a:extLst>
           </p:cNvPr>
@@ -6246,40 +6549,15 @@
           <a:p>
             <a:r>
               <a:rPr lang="en-US" dirty="0"/>
-              <a:t>Data Science Group Deck</a:t>
-            </a:r>
-          </a:p>
-        </p:txBody>
-      </p:sp>
-      <p:sp>
-        <p:nvSpPr>
-          <p:cNvPr id="3" name="Subtitle 2">
-            <a:extLst>
-              <a:ext uri="{FF2B5EF4-FFF2-40B4-BE49-F238E27FC236}">
-                <a16:creationId xmlns:a16="http://schemas.microsoft.com/office/drawing/2014/main" id="{AA132808-CD43-4E47-D884-E0D294B7C2AB}"/>
-              </a:ext>
-            </a:extLst>
-          </p:cNvPr>
-          <p:cNvSpPr>
-            <a:spLocks noGrp="1"/>
-          </p:cNvSpPr>
-          <p:nvPr>
-            <p:ph type="subTitle" idx="1"/>
-          </p:nvPr>
-        </p:nvSpPr>
-        <p:spPr/>
-        <p:txBody>
-          <a:bodyPr/>
-          <a:lstStyle/>
-          <a:p>
-            <a:endParaRPr lang="en-US"/>
+              <a:t>Thank you!</a:t>
+            </a:r>
           </a:p>
         </p:txBody>
       </p:sp>
     </p:spTree>
     <p:extLst>
       <p:ext uri="{BB962C8B-B14F-4D97-AF65-F5344CB8AC3E}">
-        <p14:creationId xmlns:p14="http://schemas.microsoft.com/office/powerpoint/2010/main" val="266467974"/>
+        <p14:creationId xmlns:p14="http://schemas.microsoft.com/office/powerpoint/2010/main" val="4012455040"/>
       </p:ext>
     </p:extLst>
   </p:cSld>
@@ -6394,7 +6672,7 @@
           <p:cNvPr id="2" name="Title 1">
             <a:extLst>
               <a:ext uri="{FF2B5EF4-FFF2-40B4-BE49-F238E27FC236}">
-                <a16:creationId xmlns:a16="http://schemas.microsoft.com/office/drawing/2014/main" id="{2FCD7E6A-3FD7-D3F8-9BD3-812FB90873FC}"/>
+                <a16:creationId xmlns:a16="http://schemas.microsoft.com/office/drawing/2014/main" id="{FBD337FB-C883-6E25-AF2A-E15D79044924}"/>
               </a:ext>
             </a:extLst>
           </p:cNvPr>
@@ -6402,32 +6680,27 @@
             <a:spLocks noGrp="1"/>
           </p:cNvSpPr>
           <p:nvPr>
-            <p:ph type="title"/>
-          </p:nvPr>
-        </p:nvSpPr>
-        <p:spPr>
-          <a:xfrm>
-            <a:off x="457200" y="639793"/>
-            <a:ext cx="10096500" cy="947467"/>
-          </a:xfrm>
-        </p:spPr>
+            <p:ph type="ctrTitle"/>
+          </p:nvPr>
+        </p:nvSpPr>
+        <p:spPr/>
         <p:txBody>
           <a:bodyPr/>
           <a:lstStyle/>
           <a:p>
             <a:r>
               <a:rPr lang="en-US" dirty="0"/>
-              <a:t>2017 Policy Data EDA:</a:t>
-            </a:r>
-          </a:p>
-        </p:txBody>
-      </p:sp>
-      <p:sp>
-        <p:nvSpPr>
-          <p:cNvPr id="3" name="Content Placeholder 2">
+              <a:t>Data Science Group Deck</a:t>
+            </a:r>
+          </a:p>
+        </p:txBody>
+      </p:sp>
+      <p:sp>
+        <p:nvSpPr>
+          <p:cNvPr id="3" name="Subtitle 2">
             <a:extLst>
               <a:ext uri="{FF2B5EF4-FFF2-40B4-BE49-F238E27FC236}">
-                <a16:creationId xmlns:a16="http://schemas.microsoft.com/office/drawing/2014/main" id="{248E8546-DBD6-7252-F007-54DD08B62CBF}"/>
+                <a16:creationId xmlns:a16="http://schemas.microsoft.com/office/drawing/2014/main" id="{AA132808-CD43-4E47-D884-E0D294B7C2AB}"/>
               </a:ext>
             </a:extLst>
           </p:cNvPr>
@@ -6435,93 +6708,22 @@
             <a:spLocks noGrp="1"/>
           </p:cNvSpPr>
           <p:nvPr>
-            <p:ph idx="1"/>
-          </p:nvPr>
-        </p:nvSpPr>
-        <p:spPr>
-          <a:xfrm>
-            <a:off x="457199" y="1587260"/>
-            <a:ext cx="10955547" cy="4546121"/>
-          </a:xfrm>
-        </p:spPr>
+            <p:ph type="subTitle" idx="1"/>
+          </p:nvPr>
+        </p:nvSpPr>
+        <p:spPr/>
         <p:txBody>
           <a:bodyPr/>
           <a:lstStyle/>
           <a:p>
-            <a:r>
-              <a:rPr lang="en-US" dirty="0"/>
-              <a:t>Total Claim Amount</a:t>
-            </a:r>
-          </a:p>
-          <a:p>
-            <a:endParaRPr lang="en-US" dirty="0"/>
-          </a:p>
-        </p:txBody>
-      </p:sp>
-      <p:pic>
-        <p:nvPicPr>
-          <p:cNvPr id="5" name="Picture 4">
-            <a:extLst>
-              <a:ext uri="{FF2B5EF4-FFF2-40B4-BE49-F238E27FC236}">
-                <a16:creationId xmlns:a16="http://schemas.microsoft.com/office/drawing/2014/main" id="{61F559D7-7D6A-F423-CF9C-DDD604FCF872}"/>
-              </a:ext>
-            </a:extLst>
-          </p:cNvPr>
-          <p:cNvPicPr>
-            <a:picLocks noChangeAspect="1"/>
-          </p:cNvPicPr>
-          <p:nvPr/>
-        </p:nvPicPr>
-        <p:blipFill>
-          <a:blip r:embed="rId2"/>
-          <a:stretch>
-            <a:fillRect/>
-          </a:stretch>
-        </p:blipFill>
-        <p:spPr>
-          <a:xfrm>
-            <a:off x="665017" y="2259265"/>
-            <a:ext cx="5223166" cy="3148922"/>
-          </a:xfrm>
-          <a:prstGeom prst="rect">
-            <a:avLst/>
-          </a:prstGeom>
-        </p:spPr>
-      </p:pic>
-      <p:pic>
-        <p:nvPicPr>
-          <p:cNvPr id="7" name="Picture 6">
-            <a:extLst>
-              <a:ext uri="{FF2B5EF4-FFF2-40B4-BE49-F238E27FC236}">
-                <a16:creationId xmlns:a16="http://schemas.microsoft.com/office/drawing/2014/main" id="{93CCBF42-330A-B662-A0F9-073475F22F31}"/>
-              </a:ext>
-            </a:extLst>
-          </p:cNvPr>
-          <p:cNvPicPr>
-            <a:picLocks noChangeAspect="1"/>
-          </p:cNvPicPr>
-          <p:nvPr/>
-        </p:nvPicPr>
-        <p:blipFill>
-          <a:blip r:embed="rId3"/>
-          <a:stretch>
-            <a:fillRect/>
-          </a:stretch>
-        </p:blipFill>
-        <p:spPr>
-          <a:xfrm>
-            <a:off x="6234546" y="2259265"/>
-            <a:ext cx="5043055" cy="3144091"/>
-          </a:xfrm>
-          <a:prstGeom prst="rect">
-            <a:avLst/>
-          </a:prstGeom>
-        </p:spPr>
-      </p:pic>
+            <a:endParaRPr lang="en-US"/>
+          </a:p>
+        </p:txBody>
+      </p:sp>
     </p:spTree>
     <p:extLst>
       <p:ext uri="{BB962C8B-B14F-4D97-AF65-F5344CB8AC3E}">
-        <p14:creationId xmlns:p14="http://schemas.microsoft.com/office/powerpoint/2010/main" val="4256411515"/>
+        <p14:creationId xmlns:p14="http://schemas.microsoft.com/office/powerpoint/2010/main" val="266467974"/>
       </p:ext>
     </p:extLst>
   </p:cSld>
@@ -6553,7 +6755,7 @@
           <p:cNvPr id="2" name="Title 1">
             <a:extLst>
               <a:ext uri="{FF2B5EF4-FFF2-40B4-BE49-F238E27FC236}">
-                <a16:creationId xmlns:a16="http://schemas.microsoft.com/office/drawing/2014/main" id="{D281814B-2642-0C7C-7A5B-F628EAEE4984}"/>
+                <a16:creationId xmlns:a16="http://schemas.microsoft.com/office/drawing/2014/main" id="{13432DF8-2346-7132-3534-76394A0D4C66}"/>
               </a:ext>
             </a:extLst>
           </p:cNvPr>
@@ -6567,7 +6769,7 @@
         <p:spPr>
           <a:xfrm>
             <a:off x="457200" y="639794"/>
-            <a:ext cx="10852030" cy="835324"/>
+            <a:ext cx="11024558" cy="614576"/>
           </a:xfrm>
         </p:spPr>
         <p:txBody>
@@ -6576,7 +6778,7 @@
           <a:p>
             <a:r>
               <a:rPr lang="en-US" dirty="0"/>
-              <a:t>2017 Policy Data EDA:</a:t>
+              <a:t>Auto Insurance Claims Dataset</a:t>
             </a:r>
           </a:p>
         </p:txBody>
@@ -6586,7 +6788,7 @@
           <p:cNvPr id="3" name="Content Placeholder 2">
             <a:extLst>
               <a:ext uri="{FF2B5EF4-FFF2-40B4-BE49-F238E27FC236}">
-                <a16:creationId xmlns:a16="http://schemas.microsoft.com/office/drawing/2014/main" id="{CF68DE36-463F-4549-7183-16C619579046}"/>
+                <a16:creationId xmlns:a16="http://schemas.microsoft.com/office/drawing/2014/main" id="{107C4BDF-CC6C-A440-CF95-FC7692CB4A29}"/>
               </a:ext>
             </a:extLst>
           </p:cNvPr>
@@ -6599,58 +6801,152 @@
         </p:nvSpPr>
         <p:spPr>
           <a:xfrm>
-            <a:off x="457199" y="1475118"/>
-            <a:ext cx="11084944" cy="4554746"/>
+            <a:off x="457200" y="1431985"/>
+            <a:ext cx="11136702" cy="4572000"/>
           </a:xfrm>
         </p:spPr>
         <p:txBody>
           <a:bodyPr/>
           <a:lstStyle/>
           <a:p>
-            <a:r>
-              <a:rPr lang="en-US" dirty="0"/>
-              <a:t>Number of Claims (Info used to create risk categories):</a:t>
-            </a:r>
-          </a:p>
-          <a:p>
-            <a:endParaRPr lang="en-US" dirty="0"/>
-          </a:p>
-        </p:txBody>
-      </p:sp>
-      <p:pic>
-        <p:nvPicPr>
-          <p:cNvPr id="5" name="Picture 4">
-            <a:extLst>
-              <a:ext uri="{FF2B5EF4-FFF2-40B4-BE49-F238E27FC236}">
-                <a16:creationId xmlns:a16="http://schemas.microsoft.com/office/drawing/2014/main" id="{489E35C3-FC82-4B6A-FD1E-5E328630652A}"/>
-              </a:ext>
-            </a:extLst>
-          </p:cNvPr>
-          <p:cNvPicPr>
-            <a:picLocks noChangeAspect="1"/>
-          </p:cNvPicPr>
-          <p:nvPr/>
-        </p:nvPicPr>
-        <p:blipFill>
-          <a:blip r:embed="rId2"/>
-          <a:stretch>
-            <a:fillRect/>
-          </a:stretch>
-        </p:blipFill>
-        <p:spPr>
-          <a:xfrm>
-            <a:off x="2026075" y="2047947"/>
-            <a:ext cx="6868543" cy="3909508"/>
-          </a:xfrm>
-          <a:prstGeom prst="rect">
-            <a:avLst/>
-          </a:prstGeom>
-        </p:spPr>
-      </p:pic>
+            <a:pPr>
+              <a:lnSpc>
+                <a:spcPct val="150000"/>
+              </a:lnSpc>
+            </a:pPr>
+            <a:r>
+              <a:rPr lang="en-US" sz="1800" b="1" dirty="0">
+                <a:effectLst/>
+                <a:latin typeface="Frutiger 45 Light"/>
+                <a:ea typeface="Frutiger 55 Roman"/>
+                <a:cs typeface="Times New Roman" panose="02020603050405020304" pitchFamily="18" charset="0"/>
+              </a:rPr>
+              <a:t>auto_policies_2017.csv</a:t>
+            </a:r>
+          </a:p>
+          <a:p>
+            <a:pPr lvl="1">
+              <a:lnSpc>
+                <a:spcPct val="150000"/>
+              </a:lnSpc>
+            </a:pPr>
+            <a:r>
+              <a:rPr lang="en-US" sz="1800" dirty="0">
+                <a:effectLst/>
+                <a:latin typeface="Frutiger 45 Light"/>
+                <a:ea typeface="Frutiger 55 Roman"/>
+                <a:cs typeface="Times New Roman" panose="02020603050405020304" pitchFamily="18" charset="0"/>
+              </a:rPr>
+              <a:t>This data set is a set of personal auto insurance policies taken out in 2017. </a:t>
+            </a:r>
+          </a:p>
+          <a:p>
+            <a:pPr lvl="1">
+              <a:lnSpc>
+                <a:spcPct val="150000"/>
+              </a:lnSpc>
+            </a:pPr>
+            <a:r>
+              <a:rPr lang="en-US" sz="1800" dirty="0">
+                <a:effectLst/>
+                <a:latin typeface="Frutiger 45 Light"/>
+                <a:ea typeface="Frutiger 55 Roman"/>
+                <a:cs typeface="Times New Roman" panose="02020603050405020304" pitchFamily="18" charset="0"/>
+              </a:rPr>
+              <a:t>There are 60,392 policies (rows), of which 10,030 had at least one claim.</a:t>
+            </a:r>
+          </a:p>
+          <a:p>
+            <a:pPr>
+              <a:lnSpc>
+                <a:spcPct val="150000"/>
+              </a:lnSpc>
+            </a:pPr>
+            <a:r>
+              <a:rPr lang="en-US" sz="1800" b="1" dirty="0">
+                <a:effectLst/>
+                <a:latin typeface="Frutiger 45 Light"/>
+                <a:ea typeface="Frutiger 55 Roman"/>
+                <a:cs typeface="Times New Roman" panose="02020603050405020304" pitchFamily="18" charset="0"/>
+              </a:rPr>
+              <a:t>auto_potential_customers_2018.csv</a:t>
+            </a:r>
+          </a:p>
+          <a:p>
+            <a:pPr lvl="1">
+              <a:lnSpc>
+                <a:spcPct val="150000"/>
+              </a:lnSpc>
+            </a:pPr>
+            <a:r>
+              <a:rPr lang="en-US" sz="1800" dirty="0">
+                <a:effectLst/>
+                <a:latin typeface="Frutiger 45 Light"/>
+                <a:ea typeface="Frutiger 55 Roman"/>
+                <a:cs typeface="Times New Roman" panose="02020603050405020304" pitchFamily="18" charset="0"/>
+              </a:rPr>
+              <a:t>This is a list of 7,464 potential customers for 2018. </a:t>
+            </a:r>
+            <a:endParaRPr lang="en-US" sz="1800" dirty="0">
+              <a:latin typeface="Frutiger 45 Light"/>
+              <a:ea typeface="Frutiger 55 Roman"/>
+              <a:cs typeface="Times New Roman" panose="02020603050405020304" pitchFamily="18" charset="0"/>
+            </a:endParaRPr>
+          </a:p>
+          <a:p>
+            <a:pPr>
+              <a:lnSpc>
+                <a:spcPct val="150000"/>
+              </a:lnSpc>
+            </a:pPr>
+            <a:r>
+              <a:rPr lang="en-US" sz="2200" dirty="0">
+                <a:effectLst/>
+                <a:latin typeface="Frutiger 45 Light"/>
+                <a:ea typeface="Frutiger 55 Roman"/>
+                <a:cs typeface="Times New Roman" panose="02020603050405020304" pitchFamily="18" charset="0"/>
+              </a:rPr>
+              <a:t>Goal:</a:t>
+            </a:r>
+          </a:p>
+          <a:p>
+            <a:pPr lvl="1">
+              <a:lnSpc>
+                <a:spcPct val="150000"/>
+              </a:lnSpc>
+            </a:pPr>
+            <a:r>
+              <a:rPr lang="en-US" sz="1800" dirty="0">
+                <a:effectLst/>
+                <a:latin typeface="Frutiger 45 Light"/>
+                <a:ea typeface="Frutiger 55 Roman"/>
+                <a:cs typeface="Times New Roman" panose="02020603050405020304" pitchFamily="18" charset="0"/>
+              </a:rPr>
+              <a:t>Target the potential customers in 2018 which will result in the lowest claim amounts.</a:t>
+            </a:r>
+          </a:p>
+          <a:p>
+            <a:pPr lvl="1">
+              <a:lnSpc>
+                <a:spcPct val="150000"/>
+              </a:lnSpc>
+            </a:pPr>
+            <a:r>
+              <a:rPr lang="en-US" sz="1800" dirty="0">
+                <a:effectLst/>
+                <a:latin typeface="Frutiger 45 Light"/>
+                <a:ea typeface="Frutiger 55 Roman"/>
+                <a:cs typeface="Times New Roman" panose="02020603050405020304" pitchFamily="18" charset="0"/>
+              </a:rPr>
+              <a:t>Creating a marketing campaign that engages with potential 2018 customers based on their risk profiles</a:t>
+            </a:r>
+          </a:p>
+        </p:txBody>
+      </p:sp>
     </p:spTree>
     <p:extLst>
       <p:ext uri="{BB962C8B-B14F-4D97-AF65-F5344CB8AC3E}">
-        <p14:creationId xmlns:p14="http://schemas.microsoft.com/office/powerpoint/2010/main" val="2846260871"/>
+        <p14:creationId xmlns:p14="http://schemas.microsoft.com/office/powerpoint/2010/main" val="2110200801"/>
       </p:ext>
     </p:extLst>
   </p:cSld>
@@ -6682,7 +6978,7 @@
           <p:cNvPr id="2" name="Title 1">
             <a:extLst>
               <a:ext uri="{FF2B5EF4-FFF2-40B4-BE49-F238E27FC236}">
-                <a16:creationId xmlns:a16="http://schemas.microsoft.com/office/drawing/2014/main" id="{1C460D5D-048E-6EF9-C0F5-A1315736A4CC}"/>
+                <a16:creationId xmlns:a16="http://schemas.microsoft.com/office/drawing/2014/main" id="{B75C27B2-5400-2CFE-4E42-30D13889F78D}"/>
               </a:ext>
             </a:extLst>
           </p:cNvPr>
@@ -6695,8 +6991,8 @@
         </p:nvSpPr>
         <p:spPr>
           <a:xfrm>
-            <a:off x="457199" y="639794"/>
-            <a:ext cx="10894291" cy="801080"/>
+            <a:off x="457200" y="517586"/>
+            <a:ext cx="11093570" cy="747308"/>
           </a:xfrm>
         </p:spPr>
         <p:txBody>
@@ -6705,46 +7001,71 @@
           <a:p>
             <a:r>
               <a:rPr lang="en-US" dirty="0"/>
-              <a:t>Gender Evaluation</a:t>
-            </a:r>
-          </a:p>
-        </p:txBody>
-      </p:sp>
-      <p:pic>
-        <p:nvPicPr>
-          <p:cNvPr id="14" name="Content Placeholder 13">
+              <a:t>Credit Risk Categories</a:t>
+            </a:r>
+          </a:p>
+        </p:txBody>
+      </p:sp>
+      <p:sp>
+        <p:nvSpPr>
+          <p:cNvPr id="3" name="Content Placeholder 2">
             <a:extLst>
               <a:ext uri="{FF2B5EF4-FFF2-40B4-BE49-F238E27FC236}">
-                <a16:creationId xmlns:a16="http://schemas.microsoft.com/office/drawing/2014/main" id="{BDD81C03-E2D6-9D58-04DB-0C6D0F1397CA}"/>
+                <a16:creationId xmlns:a16="http://schemas.microsoft.com/office/drawing/2014/main" id="{EEDCD462-B133-10CC-E29D-7F577E266F20}"/>
               </a:ext>
             </a:extLst>
           </p:cNvPr>
-          <p:cNvPicPr>
-            <a:picLocks noGrp="1" noChangeAspect="1"/>
-          </p:cNvPicPr>
+          <p:cNvSpPr>
+            <a:spLocks noGrp="1"/>
+          </p:cNvSpPr>
           <p:nvPr>
             <p:ph idx="1"/>
           </p:nvPr>
-        </p:nvPicPr>
-        <p:blipFill>
-          <a:blip r:embed="rId2"/>
-          <a:stretch>
-            <a:fillRect/>
-          </a:stretch>
-        </p:blipFill>
-        <p:spPr>
-          <a:xfrm>
-            <a:off x="1127057" y="1597891"/>
-            <a:ext cx="4248743" cy="4139358"/>
-          </a:xfrm>
-        </p:spPr>
-      </p:pic>
+        </p:nvSpPr>
+        <p:spPr>
+          <a:xfrm>
+            <a:off x="457199" y="1190445"/>
+            <a:ext cx="11205713" cy="5027761"/>
+          </a:xfrm>
+        </p:spPr>
+        <p:txBody>
+          <a:bodyPr/>
+          <a:lstStyle/>
+          <a:p>
+            <a:r>
+              <a:rPr lang="en-US" dirty="0"/>
+              <a:t>Credit Risk Categories Feature created:</a:t>
+            </a:r>
+          </a:p>
+          <a:p>
+            <a:pPr lvl="1"/>
+            <a:r>
+              <a:rPr lang="en-US" dirty="0"/>
+              <a:t>Low Risk: Number of Claims 0; High Risk: Number of Claims &gt;=1</a:t>
+            </a:r>
+          </a:p>
+          <a:p>
+            <a:pPr lvl="1"/>
+            <a:r>
+              <a:rPr lang="en-US" dirty="0"/>
+              <a:t>Imbalanced Dataset as a high number of policies had no claim.</a:t>
+            </a:r>
+          </a:p>
+          <a:p>
+            <a:pPr lvl="1"/>
+            <a:r>
+              <a:rPr lang="en-US" dirty="0"/>
+              <a:t>SMOTE Up-sampling technique used to solve this issue.</a:t>
+            </a:r>
+          </a:p>
+        </p:txBody>
+      </p:sp>
       <p:pic>
         <p:nvPicPr>
-          <p:cNvPr id="16" name="Picture 15">
+          <p:cNvPr id="5" name="Picture 4">
             <a:extLst>
               <a:ext uri="{FF2B5EF4-FFF2-40B4-BE49-F238E27FC236}">
-                <a16:creationId xmlns:a16="http://schemas.microsoft.com/office/drawing/2014/main" id="{74FAA86E-975E-3994-8573-071C1A512DCE}"/>
+                <a16:creationId xmlns:a16="http://schemas.microsoft.com/office/drawing/2014/main" id="{853E6314-C625-74C1-206E-634834C77D26}"/>
               </a:ext>
             </a:extLst>
           </p:cNvPr>
@@ -6754,15 +7075,15 @@
           <p:nvPr/>
         </p:nvPicPr>
         <p:blipFill>
-          <a:blip r:embed="rId3"/>
+          <a:blip r:embed="rId2"/>
           <a:stretch>
             <a:fillRect/>
           </a:stretch>
         </p:blipFill>
         <p:spPr>
           <a:xfrm>
-            <a:off x="5564156" y="1597891"/>
-            <a:ext cx="4439270" cy="4144121"/>
+            <a:off x="2355011" y="2803585"/>
+            <a:ext cx="6505416" cy="3333792"/>
           </a:xfrm>
           <a:prstGeom prst="rect">
             <a:avLst/>
@@ -6772,7 +7093,7 @@
     </p:spTree>
     <p:extLst>
       <p:ext uri="{BB962C8B-B14F-4D97-AF65-F5344CB8AC3E}">
-        <p14:creationId xmlns:p14="http://schemas.microsoft.com/office/powerpoint/2010/main" val="1853572123"/>
+        <p14:creationId xmlns:p14="http://schemas.microsoft.com/office/powerpoint/2010/main" val="4212388084"/>
       </p:ext>
     </p:extLst>
   </p:cSld>
@@ -6804,7 +7125,7 @@
           <p:cNvPr id="2" name="Title 1">
             <a:extLst>
               <a:ext uri="{FF2B5EF4-FFF2-40B4-BE49-F238E27FC236}">
-                <a16:creationId xmlns:a16="http://schemas.microsoft.com/office/drawing/2014/main" id="{F8B78188-FA94-45C6-5B94-1E9950E8BDDF}"/>
+                <a16:creationId xmlns:a16="http://schemas.microsoft.com/office/drawing/2014/main" id="{AF7FD989-EED0-A8A7-3962-041B413BF2C2}"/>
               </a:ext>
             </a:extLst>
           </p:cNvPr>
@@ -6817,84 +7138,854 @@
         </p:nvSpPr>
         <p:spPr>
           <a:xfrm>
-            <a:off x="457199" y="639793"/>
-            <a:ext cx="11060545" cy="791843"/>
-          </a:xfrm>
-        </p:spPr>
-        <p:txBody>
-          <a:bodyPr/>
+            <a:off x="457200" y="639793"/>
+            <a:ext cx="10843404" cy="567905"/>
+          </a:xfrm>
+        </p:spPr>
+        <p:txBody>
+          <a:bodyPr>
+            <a:normAutofit fontScale="90000"/>
+          </a:bodyPr>
           <a:lstStyle/>
           <a:p>
             <a:r>
-              <a:rPr lang="en-US" dirty="0"/>
-              <a:t>Focusing on females (majority) - Low Risk</a:t>
-            </a:r>
-          </a:p>
-        </p:txBody>
-      </p:sp>
-      <p:pic>
-        <p:nvPicPr>
-          <p:cNvPr id="5" name="Content Placeholder 4">
+              <a:rPr lang="en-US" b="1" dirty="0"/>
+              <a:t>Data Preprocessing</a:t>
+            </a:r>
+            <a:endParaRPr lang="en-US" dirty="0"/>
+          </a:p>
+        </p:txBody>
+      </p:sp>
+      <p:sp>
+        <p:nvSpPr>
+          <p:cNvPr id="3" name="Content Placeholder 2">
             <a:extLst>
               <a:ext uri="{FF2B5EF4-FFF2-40B4-BE49-F238E27FC236}">
-                <a16:creationId xmlns:a16="http://schemas.microsoft.com/office/drawing/2014/main" id="{2AC5C0A1-C34B-BB40-FD0D-96C8A0AF1818}"/>
+                <a16:creationId xmlns:a16="http://schemas.microsoft.com/office/drawing/2014/main" id="{57B70DDF-D61E-7F41-5C4A-868E6030EB46}"/>
               </a:ext>
             </a:extLst>
           </p:cNvPr>
-          <p:cNvPicPr>
-            <a:picLocks noGrp="1" noChangeAspect="1"/>
-          </p:cNvPicPr>
-          <p:nvPr>
-            <p:ph idx="1"/>
-          </p:nvPr>
-        </p:nvPicPr>
-        <p:blipFill>
-          <a:blip r:embed="rId2"/>
-          <a:stretch>
-            <a:fillRect/>
-          </a:stretch>
-        </p:blipFill>
-        <p:spPr>
-          <a:xfrm>
-            <a:off x="555301" y="1719190"/>
-            <a:ext cx="5041935" cy="3641292"/>
-          </a:xfrm>
-        </p:spPr>
-      </p:pic>
-      <p:pic>
-        <p:nvPicPr>
-          <p:cNvPr id="7" name="Picture 6">
+          <p:cNvSpPr>
+            <a:spLocks noGrp="1"/>
+          </p:cNvSpPr>
+          <p:nvPr>
+            <p:ph sz="half" idx="1"/>
+          </p:nvPr>
+        </p:nvSpPr>
+        <p:spPr>
+          <a:xfrm>
+            <a:off x="457199" y="1319842"/>
+            <a:ext cx="5184475" cy="4857121"/>
+          </a:xfrm>
+        </p:spPr>
+        <p:txBody>
+          <a:bodyPr/>
+          <a:lstStyle/>
+          <a:p>
+            <a:pPr marL="285750" marR="0" lvl="0" indent="-285750" algn="l" defTabSz="457200" rtl="0" eaLnBrk="1" fontAlgn="auto" latinLnBrk="0" hangingPunct="1">
+              <a:lnSpc>
+                <a:spcPct val="100000"/>
+              </a:lnSpc>
+              <a:spcBef>
+                <a:spcPts val="0"/>
+              </a:spcBef>
+              <a:spcAft>
+                <a:spcPts val="0"/>
+              </a:spcAft>
+              <a:buClrTx/>
+              <a:buSzTx/>
+              <a:buFont typeface="Wingdings" panose="05000000000000000000" pitchFamily="2" charset="2"/>
+              <a:buChar char="q"/>
+              <a:tabLst/>
+              <a:defRPr/>
+            </a:pPr>
+            <a:r>
+              <a:rPr kumimoji="0" lang="en-US" sz="1800" b="0" i="0" u="none" strike="noStrike" kern="1200" cap="none" spc="0" normalizeH="0" baseline="0" noProof="0" dirty="0">
+                <a:ln>
+                  <a:noFill/>
+                </a:ln>
+                <a:solidFill>
+                  <a:prstClr val="white"/>
+                </a:solidFill>
+                <a:effectLst/>
+                <a:uLnTx/>
+                <a:uFillTx/>
+                <a:latin typeface="Calibri" panose="020F0502020204030204"/>
+                <a:ea typeface="+mn-ea"/>
+                <a:cs typeface="+mn-cs"/>
+              </a:rPr>
+              <a:t>Missing Data Imputed (both datasets):</a:t>
+            </a:r>
+          </a:p>
+          <a:p>
+            <a:pPr marL="742950" marR="0" lvl="1" indent="-285750" algn="l" defTabSz="457200" rtl="0" eaLnBrk="1" fontAlgn="auto" latinLnBrk="0" hangingPunct="1">
+              <a:lnSpc>
+                <a:spcPct val="100000"/>
+              </a:lnSpc>
+              <a:spcBef>
+                <a:spcPts val="0"/>
+              </a:spcBef>
+              <a:spcAft>
+                <a:spcPts val="0"/>
+              </a:spcAft>
+              <a:buClrTx/>
+              <a:buSzTx/>
+              <a:buFont typeface="Wingdings" panose="05000000000000000000" pitchFamily="2" charset="2"/>
+              <a:buChar char="§"/>
+              <a:tabLst/>
+              <a:defRPr/>
+            </a:pPr>
+            <a:r>
+              <a:rPr kumimoji="0" lang="en-US" sz="1800" b="0" i="0" u="none" strike="noStrike" kern="1200" cap="none" spc="0" normalizeH="0" baseline="0" noProof="0" dirty="0" err="1">
+                <a:ln>
+                  <a:noFill/>
+                </a:ln>
+                <a:solidFill>
+                  <a:prstClr val="white"/>
+                </a:solidFill>
+                <a:effectLst/>
+                <a:uLnTx/>
+                <a:uFillTx/>
+                <a:latin typeface="Calibri" panose="020F0502020204030204"/>
+                <a:ea typeface="+mn-ea"/>
+                <a:cs typeface="+mn-cs"/>
+              </a:rPr>
+              <a:t>age_category</a:t>
+            </a:r>
+            <a:endParaRPr kumimoji="0" lang="en-US" sz="1800" b="0" i="0" u="none" strike="noStrike" kern="1200" cap="none" spc="0" normalizeH="0" baseline="0" noProof="0" dirty="0">
+              <a:ln>
+                <a:noFill/>
+              </a:ln>
+              <a:solidFill>
+                <a:prstClr val="white"/>
+              </a:solidFill>
+              <a:effectLst/>
+              <a:uLnTx/>
+              <a:uFillTx/>
+              <a:latin typeface="Calibri" panose="020F0502020204030204"/>
+              <a:ea typeface="+mn-ea"/>
+              <a:cs typeface="+mn-cs"/>
+            </a:endParaRPr>
+          </a:p>
+          <a:p>
+            <a:pPr marL="742950" marR="0" lvl="1" indent="-285750" algn="l" defTabSz="457200" rtl="0" eaLnBrk="1" fontAlgn="auto" latinLnBrk="0" hangingPunct="1">
+              <a:lnSpc>
+                <a:spcPct val="100000"/>
+              </a:lnSpc>
+              <a:spcBef>
+                <a:spcPts val="0"/>
+              </a:spcBef>
+              <a:spcAft>
+                <a:spcPts val="0"/>
+              </a:spcAft>
+              <a:buClrTx/>
+              <a:buSzTx/>
+              <a:buFont typeface="Wingdings" panose="05000000000000000000" pitchFamily="2" charset="2"/>
+              <a:buChar char="§"/>
+              <a:tabLst/>
+              <a:defRPr/>
+            </a:pPr>
+            <a:r>
+              <a:rPr kumimoji="0" lang="en-US" sz="1800" b="0" i="0" u="none" strike="noStrike" kern="1200" cap="none" spc="0" normalizeH="0" baseline="0" noProof="0" dirty="0" err="1">
+                <a:ln>
+                  <a:noFill/>
+                </a:ln>
+                <a:solidFill>
+                  <a:prstClr val="white"/>
+                </a:solidFill>
+                <a:effectLst/>
+                <a:uLnTx/>
+                <a:uFillTx/>
+                <a:latin typeface="Calibri" panose="020F0502020204030204"/>
+                <a:ea typeface="+mn-ea"/>
+                <a:cs typeface="+mn-cs"/>
+              </a:rPr>
+              <a:t>credit_score</a:t>
+            </a:r>
+            <a:endParaRPr kumimoji="0" lang="en-US" sz="1800" b="0" i="0" u="none" strike="noStrike" kern="1200" cap="none" spc="0" normalizeH="0" baseline="0" noProof="0" dirty="0">
+              <a:ln>
+                <a:noFill/>
+              </a:ln>
+              <a:solidFill>
+                <a:prstClr val="white"/>
+              </a:solidFill>
+              <a:effectLst/>
+              <a:uLnTx/>
+              <a:uFillTx/>
+              <a:latin typeface="Calibri" panose="020F0502020204030204"/>
+              <a:ea typeface="+mn-ea"/>
+              <a:cs typeface="+mn-cs"/>
+            </a:endParaRPr>
+          </a:p>
+          <a:p>
+            <a:pPr marL="742950" marR="0" lvl="1" indent="-285750" algn="l" defTabSz="457200" rtl="0" eaLnBrk="1" fontAlgn="auto" latinLnBrk="0" hangingPunct="1">
+              <a:lnSpc>
+                <a:spcPct val="100000"/>
+              </a:lnSpc>
+              <a:spcBef>
+                <a:spcPts val="0"/>
+              </a:spcBef>
+              <a:spcAft>
+                <a:spcPts val="0"/>
+              </a:spcAft>
+              <a:buClrTx/>
+              <a:buSzTx/>
+              <a:buFont typeface="Wingdings" panose="05000000000000000000" pitchFamily="2" charset="2"/>
+              <a:buChar char="§"/>
+              <a:tabLst/>
+              <a:defRPr/>
+            </a:pPr>
+            <a:r>
+              <a:rPr lang="en-US" sz="1800" dirty="0" err="1">
+                <a:solidFill>
+                  <a:prstClr val="white"/>
+                </a:solidFill>
+                <a:latin typeface="Calibri" panose="020F0502020204030204"/>
+              </a:rPr>
+              <a:t>traffic_index</a:t>
+            </a:r>
+            <a:endParaRPr kumimoji="0" lang="en-US" sz="1800" b="0" i="0" u="none" strike="noStrike" kern="1200" cap="none" spc="0" normalizeH="0" baseline="0" noProof="0" dirty="0">
+              <a:ln>
+                <a:noFill/>
+              </a:ln>
+              <a:solidFill>
+                <a:prstClr val="white"/>
+              </a:solidFill>
+              <a:effectLst/>
+              <a:uLnTx/>
+              <a:uFillTx/>
+              <a:latin typeface="Calibri" panose="020F0502020204030204"/>
+              <a:ea typeface="+mn-ea"/>
+              <a:cs typeface="+mn-cs"/>
+            </a:endParaRPr>
+          </a:p>
+          <a:p>
+            <a:pPr defTabSz="457200">
+              <a:lnSpc>
+                <a:spcPct val="100000"/>
+              </a:lnSpc>
+              <a:spcBef>
+                <a:spcPts val="0"/>
+              </a:spcBef>
+              <a:buClrTx/>
+              <a:buSzTx/>
+              <a:buFont typeface="Wingdings" panose="05000000000000000000" pitchFamily="2" charset="2"/>
+              <a:buChar char="q"/>
+              <a:defRPr/>
+            </a:pPr>
+            <a:r>
+              <a:rPr kumimoji="0" lang="en-US" sz="1800" b="0" i="0" u="none" strike="noStrike" kern="1200" cap="none" spc="0" normalizeH="0" baseline="0" noProof="0" dirty="0">
+                <a:ln>
+                  <a:noFill/>
+                </a:ln>
+                <a:solidFill>
+                  <a:prstClr val="white"/>
+                </a:solidFill>
+                <a:effectLst/>
+                <a:uLnTx/>
+                <a:uFillTx/>
+                <a:latin typeface="Calibri" panose="020F0502020204030204"/>
+                <a:ea typeface="+mn-ea"/>
+                <a:cs typeface="+mn-cs"/>
+              </a:rPr>
+              <a:t> Outliers removed (both datasets):</a:t>
+            </a:r>
+          </a:p>
+          <a:p>
+            <a:pPr lvl="1" defTabSz="457200">
+              <a:lnSpc>
+                <a:spcPct val="100000"/>
+              </a:lnSpc>
+              <a:spcBef>
+                <a:spcPts val="0"/>
+              </a:spcBef>
+              <a:buClrTx/>
+              <a:buSzTx/>
+              <a:buFont typeface="Wingdings" panose="05000000000000000000" pitchFamily="2" charset="2"/>
+              <a:buChar char="§"/>
+              <a:defRPr/>
+            </a:pPr>
+            <a:r>
+              <a:rPr lang="en-US" sz="1800" dirty="0" err="1">
+                <a:solidFill>
+                  <a:prstClr val="white"/>
+                </a:solidFill>
+                <a:latin typeface="Calibri" panose="020F0502020204030204"/>
+              </a:rPr>
+              <a:t>claim_amount</a:t>
+            </a:r>
+            <a:r>
+              <a:rPr lang="en-US" sz="1800" dirty="0">
+                <a:solidFill>
+                  <a:prstClr val="white"/>
+                </a:solidFill>
+                <a:latin typeface="Calibri" panose="020F0502020204030204"/>
+              </a:rPr>
+              <a:t> and </a:t>
+            </a:r>
+            <a:r>
+              <a:rPr lang="en-US" sz="1800" dirty="0" err="1">
+                <a:solidFill>
+                  <a:prstClr val="white"/>
+                </a:solidFill>
+                <a:latin typeface="Calibri" panose="020F0502020204030204"/>
+              </a:rPr>
+              <a:t>vehicle_value</a:t>
+            </a:r>
+            <a:r>
+              <a:rPr lang="en-US" sz="1800" dirty="0">
+                <a:solidFill>
+                  <a:prstClr val="white"/>
+                </a:solidFill>
+                <a:latin typeface="Calibri" panose="020F0502020204030204"/>
+              </a:rPr>
+              <a:t> </a:t>
+            </a:r>
+            <a:endParaRPr kumimoji="0" lang="en-US" sz="1800" b="0" i="0" u="none" strike="noStrike" kern="1200" cap="none" spc="0" normalizeH="0" baseline="0" noProof="0" dirty="0">
+              <a:ln>
+                <a:noFill/>
+              </a:ln>
+              <a:solidFill>
+                <a:prstClr val="white"/>
+              </a:solidFill>
+              <a:effectLst/>
+              <a:uLnTx/>
+              <a:uFillTx/>
+              <a:latin typeface="Calibri" panose="020F0502020204030204"/>
+              <a:ea typeface="+mn-ea"/>
+              <a:cs typeface="+mn-cs"/>
+            </a:endParaRPr>
+          </a:p>
+          <a:p>
+            <a:pPr marL="285750" marR="0" lvl="0" indent="-285750" algn="l" defTabSz="457200" rtl="0" eaLnBrk="1" fontAlgn="auto" latinLnBrk="0" hangingPunct="1">
+              <a:lnSpc>
+                <a:spcPct val="100000"/>
+              </a:lnSpc>
+              <a:spcBef>
+                <a:spcPts val="0"/>
+              </a:spcBef>
+              <a:spcAft>
+                <a:spcPts val="0"/>
+              </a:spcAft>
+              <a:buClrTx/>
+              <a:buSzTx/>
+              <a:buFont typeface="Wingdings" panose="05000000000000000000" pitchFamily="2" charset="2"/>
+              <a:buChar char="q"/>
+              <a:tabLst/>
+              <a:defRPr/>
+            </a:pPr>
+            <a:r>
+              <a:rPr kumimoji="0" lang="en-US" sz="1800" b="0" i="0" u="none" strike="noStrike" kern="1200" cap="none" spc="0" normalizeH="0" baseline="0" noProof="0" dirty="0">
+                <a:ln>
+                  <a:noFill/>
+                </a:ln>
+                <a:solidFill>
+                  <a:prstClr val="white"/>
+                </a:solidFill>
+                <a:effectLst/>
+                <a:uLnTx/>
+                <a:uFillTx/>
+                <a:latin typeface="Calibri" panose="020F0502020204030204"/>
+                <a:ea typeface="+mn-ea"/>
+                <a:cs typeface="+mn-cs"/>
+              </a:rPr>
+              <a:t>Label Encoding: All categorical features</a:t>
+            </a:r>
+          </a:p>
+          <a:p>
+            <a:pPr marL="285750" marR="0" lvl="0" indent="-285750" algn="l" defTabSz="457200" rtl="0" eaLnBrk="1" fontAlgn="auto" latinLnBrk="0" hangingPunct="1">
+              <a:lnSpc>
+                <a:spcPct val="100000"/>
+              </a:lnSpc>
+              <a:spcBef>
+                <a:spcPts val="0"/>
+              </a:spcBef>
+              <a:spcAft>
+                <a:spcPts val="0"/>
+              </a:spcAft>
+              <a:buClrTx/>
+              <a:buSzTx/>
+              <a:buFont typeface="Wingdings" panose="05000000000000000000" pitchFamily="2" charset="2"/>
+              <a:buChar char="q"/>
+              <a:tabLst/>
+              <a:defRPr/>
+            </a:pPr>
+            <a:r>
+              <a:rPr kumimoji="0" lang="en-US" sz="1800" b="0" i="0" u="none" strike="noStrike" kern="1200" cap="none" spc="0" normalizeH="0" baseline="0" noProof="0" dirty="0">
+                <a:ln>
+                  <a:noFill/>
+                </a:ln>
+                <a:solidFill>
+                  <a:prstClr val="white"/>
+                </a:solidFill>
+                <a:effectLst/>
+                <a:uLnTx/>
+                <a:uFillTx/>
+                <a:latin typeface="Calibri" panose="020F0502020204030204"/>
+                <a:ea typeface="+mn-ea"/>
+                <a:cs typeface="+mn-cs"/>
+              </a:rPr>
+              <a:t>New Feature Creation:</a:t>
+            </a:r>
+          </a:p>
+          <a:p>
+            <a:pPr marL="742950" marR="0" lvl="1" indent="-285750" algn="l" defTabSz="457200" rtl="0" eaLnBrk="1" fontAlgn="auto" latinLnBrk="0" hangingPunct="1">
+              <a:lnSpc>
+                <a:spcPct val="100000"/>
+              </a:lnSpc>
+              <a:spcBef>
+                <a:spcPts val="0"/>
+              </a:spcBef>
+              <a:spcAft>
+                <a:spcPts val="0"/>
+              </a:spcAft>
+              <a:buClrTx/>
+              <a:buSzTx/>
+              <a:buFont typeface="Wingdings" panose="05000000000000000000" pitchFamily="2" charset="2"/>
+              <a:buChar char="§"/>
+              <a:tabLst/>
+              <a:defRPr/>
+            </a:pPr>
+            <a:r>
+              <a:rPr kumimoji="0" lang="en-US" sz="1800" b="0" i="0" u="none" strike="noStrike" kern="1200" cap="none" spc="0" normalizeH="0" baseline="0" noProof="0" dirty="0" err="1">
+                <a:ln>
+                  <a:noFill/>
+                </a:ln>
+                <a:solidFill>
+                  <a:prstClr val="white"/>
+                </a:solidFill>
+                <a:effectLst/>
+                <a:uLnTx/>
+                <a:uFillTx/>
+                <a:latin typeface="Calibri" panose="020F0502020204030204"/>
+                <a:ea typeface="+mn-ea"/>
+                <a:cs typeface="+mn-cs"/>
+              </a:rPr>
+              <a:t>claim_risk_cat</a:t>
+            </a:r>
+            <a:r>
+              <a:rPr kumimoji="0" lang="en-US" sz="1800" b="0" i="0" u="none" strike="noStrike" kern="1200" cap="none" spc="0" normalizeH="0" baseline="0" noProof="0" dirty="0">
+                <a:ln>
+                  <a:noFill/>
+                </a:ln>
+                <a:solidFill>
+                  <a:prstClr val="white"/>
+                </a:solidFill>
+                <a:effectLst/>
+                <a:uLnTx/>
+                <a:uFillTx/>
+                <a:latin typeface="Calibri" panose="020F0502020204030204"/>
+                <a:ea typeface="+mn-ea"/>
+                <a:cs typeface="+mn-cs"/>
+              </a:rPr>
+              <a:t>, </a:t>
+            </a:r>
+            <a:r>
+              <a:rPr kumimoji="0" lang="en-US" sz="1800" b="0" i="0" u="none" strike="noStrike" kern="1200" cap="none" spc="0" normalizeH="0" baseline="0" noProof="0" dirty="0" err="1">
+                <a:ln>
+                  <a:noFill/>
+                </a:ln>
+                <a:solidFill>
+                  <a:prstClr val="white"/>
+                </a:solidFill>
+                <a:effectLst/>
+                <a:uLnTx/>
+                <a:uFillTx/>
+                <a:latin typeface="Calibri" panose="020F0502020204030204"/>
+                <a:ea typeface="+mn-ea"/>
+                <a:cs typeface="+mn-cs"/>
+              </a:rPr>
+              <a:t>credit_score_cat</a:t>
+            </a:r>
+            <a:r>
+              <a:rPr kumimoji="0" lang="en-US" sz="1800" b="0" i="0" u="none" strike="noStrike" kern="1200" cap="none" spc="0" normalizeH="0" baseline="0" noProof="0" dirty="0">
+                <a:ln>
+                  <a:noFill/>
+                </a:ln>
+                <a:solidFill>
+                  <a:prstClr val="white"/>
+                </a:solidFill>
+                <a:effectLst/>
+                <a:uLnTx/>
+                <a:uFillTx/>
+                <a:latin typeface="Calibri" panose="020F0502020204030204"/>
+                <a:ea typeface="+mn-ea"/>
+                <a:cs typeface="+mn-cs"/>
+              </a:rPr>
+              <a:t>, </a:t>
+            </a:r>
+            <a:r>
+              <a:rPr kumimoji="0" lang="en-US" sz="1800" b="0" i="0" u="none" strike="noStrike" kern="1200" cap="none" spc="0" normalizeH="0" baseline="0" noProof="0" dirty="0" err="1">
+                <a:ln>
+                  <a:noFill/>
+                </a:ln>
+                <a:solidFill>
+                  <a:prstClr val="white"/>
+                </a:solidFill>
+                <a:effectLst/>
+                <a:uLnTx/>
+                <a:uFillTx/>
+                <a:latin typeface="Calibri" panose="020F0502020204030204"/>
+                <a:ea typeface="+mn-ea"/>
+                <a:cs typeface="+mn-cs"/>
+              </a:rPr>
+              <a:t>cost_per_claim</a:t>
+            </a:r>
+            <a:r>
+              <a:rPr kumimoji="0" lang="en-US" sz="1800" b="0" i="0" u="none" strike="noStrike" kern="1200" cap="none" spc="0" normalizeH="0" baseline="0" noProof="0" dirty="0">
+                <a:ln>
+                  <a:noFill/>
+                </a:ln>
+                <a:solidFill>
+                  <a:prstClr val="white"/>
+                </a:solidFill>
+                <a:effectLst/>
+                <a:uLnTx/>
+                <a:uFillTx/>
+                <a:latin typeface="Calibri" panose="020F0502020204030204"/>
+                <a:ea typeface="+mn-ea"/>
+                <a:cs typeface="+mn-cs"/>
+              </a:rPr>
+              <a:t>.</a:t>
+            </a:r>
+          </a:p>
+          <a:p>
+            <a:pPr marL="285750" marR="0" lvl="0" indent="-285750" algn="l" defTabSz="457200" rtl="0" eaLnBrk="1" fontAlgn="auto" latinLnBrk="0" hangingPunct="1">
+              <a:lnSpc>
+                <a:spcPct val="100000"/>
+              </a:lnSpc>
+              <a:spcBef>
+                <a:spcPts val="0"/>
+              </a:spcBef>
+              <a:spcAft>
+                <a:spcPts val="0"/>
+              </a:spcAft>
+              <a:buClrTx/>
+              <a:buSzTx/>
+              <a:buFont typeface="Wingdings" panose="05000000000000000000" pitchFamily="2" charset="2"/>
+              <a:buChar char="q"/>
+              <a:tabLst/>
+              <a:defRPr/>
+            </a:pPr>
+            <a:r>
+              <a:rPr kumimoji="0" lang="en-US" sz="1800" b="0" i="0" u="none" strike="noStrike" kern="1200" cap="none" spc="0" normalizeH="0" baseline="0" noProof="0" dirty="0">
+                <a:ln>
+                  <a:noFill/>
+                </a:ln>
+                <a:solidFill>
+                  <a:prstClr val="white"/>
+                </a:solidFill>
+                <a:effectLst/>
+                <a:uLnTx/>
+                <a:uFillTx/>
+                <a:latin typeface="Calibri" panose="020F0502020204030204"/>
+                <a:ea typeface="+mn-ea"/>
+                <a:cs typeface="+mn-cs"/>
+              </a:rPr>
+              <a:t>Dropped features:</a:t>
+            </a:r>
+          </a:p>
+          <a:p>
+            <a:pPr marL="742950" marR="0" lvl="1" indent="-285750" algn="l" defTabSz="457200" rtl="0" eaLnBrk="1" fontAlgn="auto" latinLnBrk="0" hangingPunct="1">
+              <a:lnSpc>
+                <a:spcPct val="100000"/>
+              </a:lnSpc>
+              <a:spcBef>
+                <a:spcPts val="0"/>
+              </a:spcBef>
+              <a:spcAft>
+                <a:spcPts val="0"/>
+              </a:spcAft>
+              <a:buClrTx/>
+              <a:buSzTx/>
+              <a:buFont typeface="Wingdings" panose="05000000000000000000" pitchFamily="2" charset="2"/>
+              <a:buChar char="§"/>
+              <a:tabLst/>
+              <a:defRPr/>
+            </a:pPr>
+            <a:r>
+              <a:rPr kumimoji="0" lang="en-US" sz="1800" b="0" i="0" u="none" strike="noStrike" kern="1200" cap="none" spc="0" normalizeH="0" baseline="0" noProof="0" dirty="0">
+                <a:ln>
+                  <a:noFill/>
+                </a:ln>
+                <a:solidFill>
+                  <a:prstClr val="white"/>
+                </a:solidFill>
+                <a:effectLst/>
+                <a:uLnTx/>
+                <a:uFillTx/>
+                <a:latin typeface="Calibri" panose="020F0502020204030204"/>
+                <a:ea typeface="+mn-ea"/>
+                <a:cs typeface="+mn-cs"/>
+              </a:rPr>
+              <a:t>With high null values, ID/date related features and columns, not in 2018 potential data.</a:t>
+            </a:r>
+          </a:p>
+          <a:p>
+            <a:pPr marL="285750" marR="0" lvl="0" indent="-285750" algn="l" defTabSz="457200" rtl="0" eaLnBrk="1" fontAlgn="auto" latinLnBrk="0" hangingPunct="1">
+              <a:lnSpc>
+                <a:spcPct val="100000"/>
+              </a:lnSpc>
+              <a:spcBef>
+                <a:spcPts val="0"/>
+              </a:spcBef>
+              <a:spcAft>
+                <a:spcPts val="0"/>
+              </a:spcAft>
+              <a:buClrTx/>
+              <a:buSzTx/>
+              <a:buFont typeface="Wingdings" panose="05000000000000000000" pitchFamily="2" charset="2"/>
+              <a:buChar char="q"/>
+              <a:tabLst/>
+              <a:defRPr/>
+            </a:pPr>
+            <a:r>
+              <a:rPr kumimoji="0" lang="en-US" sz="1800" b="0" i="0" u="none" strike="noStrike" kern="1200" cap="none" spc="0" normalizeH="0" baseline="0" noProof="0" dirty="0">
+                <a:ln>
+                  <a:noFill/>
+                </a:ln>
+                <a:solidFill>
+                  <a:prstClr val="white"/>
+                </a:solidFill>
+                <a:effectLst/>
+                <a:uLnTx/>
+                <a:uFillTx/>
+                <a:latin typeface="Calibri" panose="020F0502020204030204"/>
+                <a:ea typeface="+mn-ea"/>
+                <a:cs typeface="+mn-cs"/>
+              </a:rPr>
+              <a:t>Data was robust-scaled:</a:t>
+            </a:r>
+          </a:p>
+          <a:p>
+            <a:pPr marL="742950" marR="0" lvl="1" indent="-285750" algn="l" defTabSz="457200" rtl="0" eaLnBrk="1" fontAlgn="auto" latinLnBrk="0" hangingPunct="1">
+              <a:lnSpc>
+                <a:spcPct val="100000"/>
+              </a:lnSpc>
+              <a:spcBef>
+                <a:spcPts val="0"/>
+              </a:spcBef>
+              <a:spcAft>
+                <a:spcPts val="0"/>
+              </a:spcAft>
+              <a:buClrTx/>
+              <a:buSzTx/>
+              <a:buFont typeface="Wingdings" panose="05000000000000000000" pitchFamily="2" charset="2"/>
+              <a:buChar char="§"/>
+              <a:tabLst/>
+              <a:defRPr/>
+            </a:pPr>
+            <a:r>
+              <a:rPr kumimoji="0" lang="en-US" sz="1800" b="0" i="0" u="none" strike="noStrike" kern="1200" cap="none" spc="0" normalizeH="0" baseline="0" noProof="0" dirty="0">
+                <a:ln>
+                  <a:noFill/>
+                </a:ln>
+                <a:solidFill>
+                  <a:prstClr val="white"/>
+                </a:solidFill>
+                <a:effectLst/>
+                <a:uLnTx/>
+                <a:uFillTx/>
+                <a:latin typeface="Calibri" panose="020F0502020204030204"/>
+                <a:ea typeface="+mn-ea"/>
+                <a:cs typeface="+mn-cs"/>
+              </a:rPr>
+              <a:t>Due to the inclusion of outliers</a:t>
+            </a:r>
+          </a:p>
+          <a:p>
+            <a:pPr defTabSz="457200">
+              <a:lnSpc>
+                <a:spcPct val="100000"/>
+              </a:lnSpc>
+              <a:spcBef>
+                <a:spcPts val="0"/>
+              </a:spcBef>
+              <a:buClrTx/>
+              <a:buSzTx/>
+              <a:buFont typeface="Wingdings" panose="05000000000000000000" pitchFamily="2" charset="2"/>
+              <a:buChar char="q"/>
+              <a:defRPr/>
+            </a:pPr>
+            <a:endParaRPr kumimoji="0" lang="en-US" sz="2200" b="0" i="0" u="none" strike="noStrike" kern="1200" cap="none" spc="0" normalizeH="0" baseline="0" noProof="0" dirty="0">
+              <a:ln>
+                <a:noFill/>
+              </a:ln>
+              <a:solidFill>
+                <a:prstClr val="white"/>
+              </a:solidFill>
+              <a:effectLst/>
+              <a:uLnTx/>
+              <a:uFillTx/>
+              <a:latin typeface="Calibri" panose="020F0502020204030204"/>
+              <a:ea typeface="+mn-ea"/>
+              <a:cs typeface="+mn-cs"/>
+            </a:endParaRPr>
+          </a:p>
+          <a:p>
+            <a:endParaRPr lang="en-US" dirty="0"/>
+          </a:p>
+        </p:txBody>
+      </p:sp>
+      <p:sp>
+        <p:nvSpPr>
+          <p:cNvPr id="4" name="Content Placeholder 3">
             <a:extLst>
               <a:ext uri="{FF2B5EF4-FFF2-40B4-BE49-F238E27FC236}">
-                <a16:creationId xmlns:a16="http://schemas.microsoft.com/office/drawing/2014/main" id="{A6BD222F-9845-C33C-4EB3-6AD7A4C7A6B7}"/>
+                <a16:creationId xmlns:a16="http://schemas.microsoft.com/office/drawing/2014/main" id="{2C1DC268-F79E-F52F-1FBC-A1F620BD8128}"/>
               </a:ext>
             </a:extLst>
           </p:cNvPr>
-          <p:cNvPicPr>
-            <a:picLocks noChangeAspect="1"/>
-          </p:cNvPicPr>
-          <p:nvPr/>
-        </p:nvPicPr>
-        <p:blipFill>
-          <a:blip r:embed="rId3"/>
-          <a:stretch>
-            <a:fillRect/>
-          </a:stretch>
-        </p:blipFill>
-        <p:spPr>
-          <a:xfrm>
-            <a:off x="5879055" y="1719190"/>
-            <a:ext cx="5223054" cy="3641292"/>
-          </a:xfrm>
-          <a:prstGeom prst="rect">
-            <a:avLst/>
-          </a:prstGeom>
-        </p:spPr>
-      </p:pic>
+          <p:cNvSpPr>
+            <a:spLocks noGrp="1"/>
+          </p:cNvSpPr>
+          <p:nvPr>
+            <p:ph sz="half" idx="2"/>
+          </p:nvPr>
+        </p:nvSpPr>
+        <p:spPr>
+          <a:xfrm>
+            <a:off x="5865962" y="1397479"/>
+            <a:ext cx="5796950" cy="4779484"/>
+          </a:xfrm>
+        </p:spPr>
+        <p:txBody>
+          <a:bodyPr/>
+          <a:lstStyle/>
+          <a:p>
+            <a:pPr>
+              <a:buFont typeface="Wingdings" panose="05000000000000000000" pitchFamily="2" charset="2"/>
+              <a:buChar char="q"/>
+            </a:pPr>
+            <a:r>
+              <a:rPr lang="en-US" sz="1800" dirty="0"/>
+              <a:t>SMOTE up sampling technique used.</a:t>
+            </a:r>
+          </a:p>
+          <a:p>
+            <a:pPr>
+              <a:buFont typeface="Wingdings" panose="05000000000000000000" pitchFamily="2" charset="2"/>
+              <a:buChar char="q"/>
+            </a:pPr>
+            <a:r>
+              <a:rPr lang="en-US" sz="1800" dirty="0"/>
+              <a:t>LightGBM model attempted.</a:t>
+            </a:r>
+          </a:p>
+          <a:p>
+            <a:pPr>
+              <a:buFont typeface="Wingdings" panose="05000000000000000000" pitchFamily="2" charset="2"/>
+              <a:buChar char="q"/>
+            </a:pPr>
+            <a:r>
+              <a:rPr lang="en-US" sz="1800" dirty="0"/>
+              <a:t>Hyperparameters were tuned based on the F1 metric via </a:t>
+            </a:r>
+            <a:r>
+              <a:rPr lang="en-US" sz="1800" i="0" dirty="0" err="1">
+                <a:effectLst/>
+                <a:latin typeface="+mj-lt"/>
+              </a:rPr>
+              <a:t>RandomizedSearchCV</a:t>
+            </a:r>
+            <a:r>
+              <a:rPr lang="en-US" sz="1800" i="0" dirty="0">
+                <a:effectLst/>
+                <a:latin typeface="+mj-lt"/>
+              </a:rPr>
+              <a:t>.</a:t>
+            </a:r>
+          </a:p>
+          <a:p>
+            <a:pPr>
+              <a:buFont typeface="Wingdings" panose="05000000000000000000" pitchFamily="2" charset="2"/>
+              <a:buChar char="q"/>
+            </a:pPr>
+            <a:r>
+              <a:rPr lang="en-US" sz="1800" dirty="0"/>
+              <a:t> 2017 Policy info dataset was used as training and the 2018 Potential Policy dataset was used as a test dataset and labels were predicted.</a:t>
+            </a:r>
+          </a:p>
+          <a:p>
+            <a:pPr>
+              <a:buFont typeface="Wingdings" panose="05000000000000000000" pitchFamily="2" charset="2"/>
+              <a:buChar char="q"/>
+            </a:pPr>
+            <a:r>
+              <a:rPr lang="en-US" sz="1800" dirty="0"/>
+              <a:t>LightGBM Hyperparameters:</a:t>
+            </a:r>
+          </a:p>
+          <a:p>
+            <a:pPr lvl="1">
+              <a:buFont typeface="Wingdings" panose="05000000000000000000" pitchFamily="2" charset="2"/>
+              <a:buChar char="§"/>
+            </a:pPr>
+            <a:r>
+              <a:rPr lang="en-US" sz="1400" dirty="0"/>
+              <a:t>subsample: 0.8</a:t>
+            </a:r>
+          </a:p>
+          <a:p>
+            <a:pPr lvl="1">
+              <a:buFont typeface="Wingdings" panose="05000000000000000000" pitchFamily="2" charset="2"/>
+              <a:buChar char="§"/>
+            </a:pPr>
+            <a:r>
+              <a:rPr lang="en-US" sz="1400" dirty="0" err="1"/>
+              <a:t>num_leaves</a:t>
+            </a:r>
+            <a:r>
+              <a:rPr lang="en-US" sz="1400" dirty="0"/>
+              <a:t>: 100</a:t>
+            </a:r>
+          </a:p>
+          <a:p>
+            <a:pPr lvl="1">
+              <a:buFont typeface="Wingdings" panose="05000000000000000000" pitchFamily="2" charset="2"/>
+              <a:buChar char="§"/>
+            </a:pPr>
+            <a:r>
+              <a:rPr lang="en-US" sz="1400" dirty="0"/>
+              <a:t>n_estimators: 120</a:t>
+            </a:r>
+          </a:p>
+          <a:p>
+            <a:pPr lvl="1">
+              <a:buFont typeface="Wingdings" panose="05000000000000000000" pitchFamily="2" charset="2"/>
+              <a:buChar char="§"/>
+            </a:pPr>
+            <a:r>
+              <a:rPr lang="en-US" sz="1400" dirty="0"/>
+              <a:t>max_depth: 6</a:t>
+            </a:r>
+          </a:p>
+          <a:p>
+            <a:pPr lvl="1">
+              <a:buFont typeface="Wingdings" panose="05000000000000000000" pitchFamily="2" charset="2"/>
+              <a:buChar char="§"/>
+            </a:pPr>
+            <a:r>
+              <a:rPr lang="en-US" sz="1400" dirty="0"/>
+              <a:t>learning_rate: 0.687</a:t>
+            </a:r>
+          </a:p>
+          <a:p>
+            <a:pPr lvl="1">
+              <a:buFont typeface="Wingdings" panose="05000000000000000000" pitchFamily="2" charset="2"/>
+              <a:buChar char="§"/>
+            </a:pPr>
+            <a:r>
+              <a:rPr lang="en-US" sz="1400" dirty="0"/>
+              <a:t>colsample_bytree: 1</a:t>
+            </a:r>
+          </a:p>
+        </p:txBody>
+      </p:sp>
     </p:spTree>
     <p:extLst>
       <p:ext uri="{BB962C8B-B14F-4D97-AF65-F5344CB8AC3E}">
-        <p14:creationId xmlns:p14="http://schemas.microsoft.com/office/powerpoint/2010/main" val="4025147930"/>
+        <p14:creationId xmlns:p14="http://schemas.microsoft.com/office/powerpoint/2010/main" val="426430643"/>
       </p:ext>
     </p:extLst>
   </p:cSld>
@@ -6926,7 +8017,7 @@
           <p:cNvPr id="2" name="Title 1">
             <a:extLst>
               <a:ext uri="{FF2B5EF4-FFF2-40B4-BE49-F238E27FC236}">
-                <a16:creationId xmlns:a16="http://schemas.microsoft.com/office/drawing/2014/main" id="{56F00631-B42A-A942-7BA2-36A0391C4B1A}"/>
+                <a16:creationId xmlns:a16="http://schemas.microsoft.com/office/drawing/2014/main" id="{2FCD7E6A-3FD7-D3F8-9BD3-812FB90873FC}"/>
               </a:ext>
             </a:extLst>
           </p:cNvPr>
@@ -6939,8 +8030,8 @@
         </p:nvSpPr>
         <p:spPr>
           <a:xfrm>
-            <a:off x="464127" y="613913"/>
-            <a:ext cx="11263745" cy="736425"/>
+            <a:off x="457200" y="639793"/>
+            <a:ext cx="10096500" cy="947467"/>
           </a:xfrm>
         </p:spPr>
         <p:txBody>
@@ -6949,26 +8040,60 @@
           <a:p>
             <a:r>
               <a:rPr lang="en-US" dirty="0"/>
-              <a:t>Focusing on females (majority) - Low Risk</a:t>
-            </a:r>
+              <a:t>2017 Policy Data EDA:</a:t>
+            </a:r>
+          </a:p>
+        </p:txBody>
+      </p:sp>
+      <p:sp>
+        <p:nvSpPr>
+          <p:cNvPr id="3" name="Content Placeholder 2">
+            <a:extLst>
+              <a:ext uri="{FF2B5EF4-FFF2-40B4-BE49-F238E27FC236}">
+                <a16:creationId xmlns:a16="http://schemas.microsoft.com/office/drawing/2014/main" id="{248E8546-DBD6-7252-F007-54DD08B62CBF}"/>
+              </a:ext>
+            </a:extLst>
+          </p:cNvPr>
+          <p:cNvSpPr>
+            <a:spLocks noGrp="1"/>
+          </p:cNvSpPr>
+          <p:nvPr>
+            <p:ph idx="1"/>
+          </p:nvPr>
+        </p:nvSpPr>
+        <p:spPr>
+          <a:xfrm>
+            <a:off x="457199" y="1587260"/>
+            <a:ext cx="10955547" cy="4546121"/>
+          </a:xfrm>
+        </p:spPr>
+        <p:txBody>
+          <a:bodyPr/>
+          <a:lstStyle/>
+          <a:p>
+            <a:r>
+              <a:rPr lang="en-US" dirty="0"/>
+              <a:t>Total Claim Amount</a:t>
+            </a:r>
+          </a:p>
+          <a:p>
+            <a:endParaRPr lang="en-US" dirty="0"/>
           </a:p>
         </p:txBody>
       </p:sp>
       <p:pic>
         <p:nvPicPr>
-          <p:cNvPr id="5" name="Content Placeholder 4">
+          <p:cNvPr id="5" name="Picture 4">
             <a:extLst>
               <a:ext uri="{FF2B5EF4-FFF2-40B4-BE49-F238E27FC236}">
-                <a16:creationId xmlns:a16="http://schemas.microsoft.com/office/drawing/2014/main" id="{1DEEB738-1779-48A8-788B-52B627D02130}"/>
+                <a16:creationId xmlns:a16="http://schemas.microsoft.com/office/drawing/2014/main" id="{61F559D7-7D6A-F423-CF9C-DDD604FCF872}"/>
               </a:ext>
             </a:extLst>
           </p:cNvPr>
           <p:cNvPicPr>
-            <a:picLocks noGrp="1" noChangeAspect="1"/>
+            <a:picLocks noChangeAspect="1"/>
           </p:cNvPicPr>
-          <p:nvPr>
-            <p:ph idx="1"/>
-          </p:nvPr>
+          <p:nvPr/>
         </p:nvPicPr>
         <p:blipFill>
           <a:blip r:embed="rId2"/>
@@ -6978,15 +8103,48 @@
         </p:blipFill>
         <p:spPr>
           <a:xfrm>
-            <a:off x="2544364" y="1575976"/>
-            <a:ext cx="6401229" cy="4021753"/>
-          </a:xfrm>
+            <a:off x="665017" y="2259265"/>
+            <a:ext cx="5223166" cy="3148922"/>
+          </a:xfrm>
+          <a:prstGeom prst="rect">
+            <a:avLst/>
+          </a:prstGeom>
+        </p:spPr>
+      </p:pic>
+      <p:pic>
+        <p:nvPicPr>
+          <p:cNvPr id="7" name="Picture 6">
+            <a:extLst>
+              <a:ext uri="{FF2B5EF4-FFF2-40B4-BE49-F238E27FC236}">
+                <a16:creationId xmlns:a16="http://schemas.microsoft.com/office/drawing/2014/main" id="{93CCBF42-330A-B662-A0F9-073475F22F31}"/>
+              </a:ext>
+            </a:extLst>
+          </p:cNvPr>
+          <p:cNvPicPr>
+            <a:picLocks noChangeAspect="1"/>
+          </p:cNvPicPr>
+          <p:nvPr/>
+        </p:nvPicPr>
+        <p:blipFill>
+          <a:blip r:embed="rId3"/>
+          <a:stretch>
+            <a:fillRect/>
+          </a:stretch>
+        </p:blipFill>
+        <p:spPr>
+          <a:xfrm>
+            <a:off x="6234546" y="2259265"/>
+            <a:ext cx="5043055" cy="3144091"/>
+          </a:xfrm>
+          <a:prstGeom prst="rect">
+            <a:avLst/>
+          </a:prstGeom>
         </p:spPr>
       </p:pic>
     </p:spTree>
     <p:extLst>
       <p:ext uri="{BB962C8B-B14F-4D97-AF65-F5344CB8AC3E}">
-        <p14:creationId xmlns:p14="http://schemas.microsoft.com/office/powerpoint/2010/main" val="2781436901"/>
+        <p14:creationId xmlns:p14="http://schemas.microsoft.com/office/powerpoint/2010/main" val="4256411515"/>
       </p:ext>
     </p:extLst>
   </p:cSld>
@@ -7018,7 +8176,7 @@
           <p:cNvPr id="2" name="Title 1">
             <a:extLst>
               <a:ext uri="{FF2B5EF4-FFF2-40B4-BE49-F238E27FC236}">
-                <a16:creationId xmlns:a16="http://schemas.microsoft.com/office/drawing/2014/main" id="{3077414B-7C12-CF89-1E77-CE71AEE0131B}"/>
+                <a16:creationId xmlns:a16="http://schemas.microsoft.com/office/drawing/2014/main" id="{D281814B-2642-0C7C-7A5B-F628EAEE4984}"/>
               </a:ext>
             </a:extLst>
           </p:cNvPr>
@@ -7031,8 +8189,8 @@
         </p:nvSpPr>
         <p:spPr>
           <a:xfrm>
-            <a:off x="457199" y="639794"/>
-            <a:ext cx="10826151" cy="705928"/>
+            <a:off x="457200" y="639794"/>
+            <a:ext cx="10852030" cy="835324"/>
           </a:xfrm>
         </p:spPr>
         <p:txBody>
@@ -7041,46 +8199,53 @@
           <a:p>
             <a:r>
               <a:rPr lang="en-US" dirty="0"/>
-              <a:t>Focusing on males (majority) - High Risk</a:t>
-            </a:r>
-          </a:p>
-        </p:txBody>
-      </p:sp>
-      <p:pic>
-        <p:nvPicPr>
-          <p:cNvPr id="5" name="Content Placeholder 4">
+              <a:t>2017 Policy Data EDA:</a:t>
+            </a:r>
+          </a:p>
+        </p:txBody>
+      </p:sp>
+      <p:sp>
+        <p:nvSpPr>
+          <p:cNvPr id="3" name="Content Placeholder 2">
             <a:extLst>
               <a:ext uri="{FF2B5EF4-FFF2-40B4-BE49-F238E27FC236}">
-                <a16:creationId xmlns:a16="http://schemas.microsoft.com/office/drawing/2014/main" id="{E2F3ACC3-47E0-78FD-BE1E-0CEEFA67D94A}"/>
+                <a16:creationId xmlns:a16="http://schemas.microsoft.com/office/drawing/2014/main" id="{CF68DE36-463F-4549-7183-16C619579046}"/>
               </a:ext>
             </a:extLst>
           </p:cNvPr>
-          <p:cNvPicPr>
-            <a:picLocks noGrp="1" noChangeAspect="1"/>
-          </p:cNvPicPr>
+          <p:cNvSpPr>
+            <a:spLocks noGrp="1"/>
+          </p:cNvSpPr>
           <p:nvPr>
             <p:ph idx="1"/>
           </p:nvPr>
-        </p:nvPicPr>
-        <p:blipFill>
-          <a:blip r:embed="rId2"/>
-          <a:stretch>
-            <a:fillRect/>
-          </a:stretch>
-        </p:blipFill>
-        <p:spPr>
-          <a:xfrm>
-            <a:off x="487194" y="1591812"/>
-            <a:ext cx="5350188" cy="3859102"/>
-          </a:xfrm>
-        </p:spPr>
-      </p:pic>
+        </p:nvSpPr>
+        <p:spPr>
+          <a:xfrm>
+            <a:off x="457199" y="1475118"/>
+            <a:ext cx="11084944" cy="4554746"/>
+          </a:xfrm>
+        </p:spPr>
+        <p:txBody>
+          <a:bodyPr/>
+          <a:lstStyle/>
+          <a:p>
+            <a:r>
+              <a:rPr lang="en-US" dirty="0"/>
+              <a:t>Number of Claims (Info used to create risk categories):</a:t>
+            </a:r>
+          </a:p>
+          <a:p>
+            <a:endParaRPr lang="en-US" dirty="0"/>
+          </a:p>
+        </p:txBody>
+      </p:sp>
       <p:pic>
         <p:nvPicPr>
-          <p:cNvPr id="7" name="Picture 6">
+          <p:cNvPr id="5" name="Picture 4">
             <a:extLst>
               <a:ext uri="{FF2B5EF4-FFF2-40B4-BE49-F238E27FC236}">
-                <a16:creationId xmlns:a16="http://schemas.microsoft.com/office/drawing/2014/main" id="{0980B469-4F6E-6686-8852-D15B15A74E07}"/>
+                <a16:creationId xmlns:a16="http://schemas.microsoft.com/office/drawing/2014/main" id="{489E35C3-FC82-4B6A-FD1E-5E328630652A}"/>
               </a:ext>
             </a:extLst>
           </p:cNvPr>
@@ -7090,15 +8255,15 @@
           <p:nvPr/>
         </p:nvPicPr>
         <p:blipFill>
-          <a:blip r:embed="rId3"/>
+          <a:blip r:embed="rId2"/>
           <a:stretch>
             <a:fillRect/>
           </a:stretch>
         </p:blipFill>
         <p:spPr>
           <a:xfrm>
-            <a:off x="6159194" y="1591812"/>
-            <a:ext cx="5545612" cy="3859103"/>
+            <a:off x="2026075" y="2047947"/>
+            <a:ext cx="6868543" cy="3909508"/>
           </a:xfrm>
           <a:prstGeom prst="rect">
             <a:avLst/>
@@ -7108,7 +8273,7 @@
     </p:spTree>
     <p:extLst>
       <p:ext uri="{BB962C8B-B14F-4D97-AF65-F5344CB8AC3E}">
-        <p14:creationId xmlns:p14="http://schemas.microsoft.com/office/powerpoint/2010/main" val="2851179346"/>
+        <p14:creationId xmlns:p14="http://schemas.microsoft.com/office/powerpoint/2010/main" val="2846260871"/>
       </p:ext>
     </p:extLst>
   </p:cSld>
@@ -7140,7 +8305,7 @@
           <p:cNvPr id="2" name="Title 1">
             <a:extLst>
               <a:ext uri="{FF2B5EF4-FFF2-40B4-BE49-F238E27FC236}">
-                <a16:creationId xmlns:a16="http://schemas.microsoft.com/office/drawing/2014/main" id="{DF92D068-3F7C-26C2-88E1-CEB185D6DA5D}"/>
+                <a16:creationId xmlns:a16="http://schemas.microsoft.com/office/drawing/2014/main" id="{1C460D5D-048E-6EF9-C0F5-A1315736A4CC}"/>
               </a:ext>
             </a:extLst>
           </p:cNvPr>
@@ -7153,8 +8318,8 @@
         </p:nvSpPr>
         <p:spPr>
           <a:xfrm>
-            <a:off x="457199" y="639793"/>
-            <a:ext cx="11197087" cy="697301"/>
+            <a:off x="457199" y="639794"/>
+            <a:ext cx="10894291" cy="801080"/>
           </a:xfrm>
         </p:spPr>
         <p:txBody>
@@ -7163,17 +8328,17 @@
           <a:p>
             <a:r>
               <a:rPr lang="en-US" dirty="0"/>
-              <a:t>Focusing on males (majority) - High Risk</a:t>
+              <a:t>Gender Evaluation</a:t>
             </a:r>
           </a:p>
         </p:txBody>
       </p:sp>
       <p:pic>
         <p:nvPicPr>
-          <p:cNvPr id="9" name="Content Placeholder 8">
+          <p:cNvPr id="14" name="Content Placeholder 13">
             <a:extLst>
               <a:ext uri="{FF2B5EF4-FFF2-40B4-BE49-F238E27FC236}">
-                <a16:creationId xmlns:a16="http://schemas.microsoft.com/office/drawing/2014/main" id="{93CE467A-B646-F33D-A717-8A6409E3FFCB}"/>
+                <a16:creationId xmlns:a16="http://schemas.microsoft.com/office/drawing/2014/main" id="{BDD81C03-E2D6-9D58-04DB-0C6D0F1397CA}"/>
               </a:ext>
             </a:extLst>
           </p:cNvPr>
@@ -7192,15 +8357,45 @@
         </p:blipFill>
         <p:spPr>
           <a:xfrm>
-            <a:off x="3233474" y="1606549"/>
-            <a:ext cx="5644536" cy="3787487"/>
-          </a:xfrm>
+            <a:off x="1127057" y="1597891"/>
+            <a:ext cx="4248743" cy="4139358"/>
+          </a:xfrm>
+        </p:spPr>
+      </p:pic>
+      <p:pic>
+        <p:nvPicPr>
+          <p:cNvPr id="16" name="Picture 15">
+            <a:extLst>
+              <a:ext uri="{FF2B5EF4-FFF2-40B4-BE49-F238E27FC236}">
+                <a16:creationId xmlns:a16="http://schemas.microsoft.com/office/drawing/2014/main" id="{74FAA86E-975E-3994-8573-071C1A512DCE}"/>
+              </a:ext>
+            </a:extLst>
+          </p:cNvPr>
+          <p:cNvPicPr>
+            <a:picLocks noChangeAspect="1"/>
+          </p:cNvPicPr>
+          <p:nvPr/>
+        </p:nvPicPr>
+        <p:blipFill>
+          <a:blip r:embed="rId3"/>
+          <a:stretch>
+            <a:fillRect/>
+          </a:stretch>
+        </p:blipFill>
+        <p:spPr>
+          <a:xfrm>
+            <a:off x="5564156" y="1597891"/>
+            <a:ext cx="4439270" cy="4144121"/>
+          </a:xfrm>
+          <a:prstGeom prst="rect">
+            <a:avLst/>
+          </a:prstGeom>
         </p:spPr>
       </p:pic>
     </p:spTree>
     <p:extLst>
       <p:ext uri="{BB962C8B-B14F-4D97-AF65-F5344CB8AC3E}">
-        <p14:creationId xmlns:p14="http://schemas.microsoft.com/office/powerpoint/2010/main" val="4079695075"/>
+        <p14:creationId xmlns:p14="http://schemas.microsoft.com/office/powerpoint/2010/main" val="1853572123"/>
       </p:ext>
     </p:extLst>
   </p:cSld>
@@ -7232,7 +8427,7 @@
           <p:cNvPr id="2" name="Title 1">
             <a:extLst>
               <a:ext uri="{FF2B5EF4-FFF2-40B4-BE49-F238E27FC236}">
-                <a16:creationId xmlns:a16="http://schemas.microsoft.com/office/drawing/2014/main" id="{98796A30-8CE5-5B98-8490-C6B66183929F}"/>
+                <a16:creationId xmlns:a16="http://schemas.microsoft.com/office/drawing/2014/main" id="{F8B78188-FA94-45C6-5B94-1E9950E8BDDF}"/>
               </a:ext>
             </a:extLst>
           </p:cNvPr>
@@ -7245,8 +8440,8 @@
         </p:nvSpPr>
         <p:spPr>
           <a:xfrm>
-            <a:off x="457200" y="639794"/>
-            <a:ext cx="10912764" cy="614575"/>
+            <a:off x="457199" y="639793"/>
+            <a:ext cx="11060545" cy="791843"/>
           </a:xfrm>
         </p:spPr>
         <p:txBody>
@@ -7255,17 +8450,17 @@
           <a:p>
             <a:r>
               <a:rPr lang="en-US" dirty="0"/>
-              <a:t>Credit Score vs Total Claim Amounts</a:t>
+              <a:t>Focusing on females (majority) - Low Risk</a:t>
             </a:r>
           </a:p>
         </p:txBody>
       </p:sp>
       <p:pic>
         <p:nvPicPr>
-          <p:cNvPr id="9" name="Content Placeholder 8">
+          <p:cNvPr id="5" name="Content Placeholder 4">
             <a:extLst>
               <a:ext uri="{FF2B5EF4-FFF2-40B4-BE49-F238E27FC236}">
-                <a16:creationId xmlns:a16="http://schemas.microsoft.com/office/drawing/2014/main" id="{69061435-B030-168A-80AE-6E30F99C75DF}"/>
+                <a16:creationId xmlns:a16="http://schemas.microsoft.com/office/drawing/2014/main" id="{2AC5C0A1-C34B-BB40-FD0D-96C8A0AF1818}"/>
               </a:ext>
             </a:extLst>
           </p:cNvPr>
@@ -7284,17 +8479,17 @@
         </p:blipFill>
         <p:spPr>
           <a:xfrm>
-            <a:off x="457200" y="1682967"/>
-            <a:ext cx="5435600" cy="3492066"/>
+            <a:off x="555301" y="1719190"/>
+            <a:ext cx="5041935" cy="3641292"/>
           </a:xfrm>
         </p:spPr>
       </p:pic>
       <p:pic>
         <p:nvPicPr>
-          <p:cNvPr id="11" name="Picture 10">
+          <p:cNvPr id="7" name="Picture 6">
             <a:extLst>
               <a:ext uri="{FF2B5EF4-FFF2-40B4-BE49-F238E27FC236}">
-                <a16:creationId xmlns:a16="http://schemas.microsoft.com/office/drawing/2014/main" id="{6A990812-3100-7C4A-45FD-EFC0940F5B47}"/>
+                <a16:creationId xmlns:a16="http://schemas.microsoft.com/office/drawing/2014/main" id="{A6BD222F-9845-C33C-4EB3-6AD7A4C7A6B7}"/>
               </a:ext>
             </a:extLst>
           </p:cNvPr>
@@ -7311,8 +8506,8 @@
         </p:blipFill>
         <p:spPr>
           <a:xfrm>
-            <a:off x="6143975" y="1682967"/>
-            <a:ext cx="5225989" cy="3492066"/>
+            <a:off x="5879055" y="1719190"/>
+            <a:ext cx="5223054" cy="3641292"/>
           </a:xfrm>
           <a:prstGeom prst="rect">
             <a:avLst/>
@@ -7322,7 +8517,7 @@
     </p:spTree>
     <p:extLst>
       <p:ext uri="{BB962C8B-B14F-4D97-AF65-F5344CB8AC3E}">
-        <p14:creationId xmlns:p14="http://schemas.microsoft.com/office/powerpoint/2010/main" val="2404060174"/>
+        <p14:creationId xmlns:p14="http://schemas.microsoft.com/office/powerpoint/2010/main" val="4025147930"/>
       </p:ext>
     </p:extLst>
   </p:cSld>
@@ -7354,7 +8549,7 @@
           <p:cNvPr id="2" name="Title 1">
             <a:extLst>
               <a:ext uri="{FF2B5EF4-FFF2-40B4-BE49-F238E27FC236}">
-                <a16:creationId xmlns:a16="http://schemas.microsoft.com/office/drawing/2014/main" id="{B62FCE0A-C12F-F4F9-6E7E-89F151227D4F}"/>
+                <a16:creationId xmlns:a16="http://schemas.microsoft.com/office/drawing/2014/main" id="{56F00631-B42A-A942-7BA2-36A0391C4B1A}"/>
               </a:ext>
             </a:extLst>
           </p:cNvPr>
@@ -7367,8 +8562,8 @@
         </p:nvSpPr>
         <p:spPr>
           <a:xfrm>
-            <a:off x="457199" y="639794"/>
-            <a:ext cx="11152909" cy="745662"/>
+            <a:off x="464127" y="613913"/>
+            <a:ext cx="11263745" cy="736425"/>
           </a:xfrm>
         </p:spPr>
         <p:txBody>
@@ -7377,7 +8572,7 @@
           <a:p>
             <a:r>
               <a:rPr lang="en-US" dirty="0"/>
-              <a:t>Traffic Index vs Claim Risk Categories</a:t>
+              <a:t>Focusing on females (majority) - Low Risk</a:t>
             </a:r>
           </a:p>
         </p:txBody>
@@ -7387,7 +8582,7 @@
           <p:cNvPr id="5" name="Content Placeholder 4">
             <a:extLst>
               <a:ext uri="{FF2B5EF4-FFF2-40B4-BE49-F238E27FC236}">
-                <a16:creationId xmlns:a16="http://schemas.microsoft.com/office/drawing/2014/main" id="{4AB0D78B-C892-65CB-37F7-9C63E2041DCF}"/>
+                <a16:creationId xmlns:a16="http://schemas.microsoft.com/office/drawing/2014/main" id="{1DEEB738-1779-48A8-788B-52B627D02130}"/>
               </a:ext>
             </a:extLst>
           </p:cNvPr>
@@ -7406,15 +8601,15 @@
         </p:blipFill>
         <p:spPr>
           <a:xfrm>
-            <a:off x="2476072" y="1550988"/>
-            <a:ext cx="6392365" cy="3935412"/>
+            <a:off x="2544364" y="1575976"/>
+            <a:ext cx="6401229" cy="4021753"/>
           </a:xfrm>
         </p:spPr>
       </p:pic>
     </p:spTree>
     <p:extLst>
       <p:ext uri="{BB962C8B-B14F-4D97-AF65-F5344CB8AC3E}">
-        <p14:creationId xmlns:p14="http://schemas.microsoft.com/office/powerpoint/2010/main" val="40079428"/>
+        <p14:creationId xmlns:p14="http://schemas.microsoft.com/office/powerpoint/2010/main" val="2781436901"/>
       </p:ext>
     </p:extLst>
   </p:cSld>
@@ -7446,7 +8641,7 @@
           <p:cNvPr id="2" name="Title 1">
             <a:extLst>
               <a:ext uri="{FF2B5EF4-FFF2-40B4-BE49-F238E27FC236}">
-                <a16:creationId xmlns:a16="http://schemas.microsoft.com/office/drawing/2014/main" id="{8C465EDD-AE2C-EEB8-91B5-C20D0FD225C3}"/>
+                <a16:creationId xmlns:a16="http://schemas.microsoft.com/office/drawing/2014/main" id="{3077414B-7C12-CF89-1E77-CE71AEE0131B}"/>
               </a:ext>
             </a:extLst>
           </p:cNvPr>
@@ -7460,101 +8655,35 @@
         <p:spPr>
           <a:xfrm>
             <a:off x="457199" y="639794"/>
-            <a:ext cx="11411081" cy="596224"/>
-          </a:xfrm>
-        </p:spPr>
-        <p:txBody>
-          <a:bodyPr>
-            <a:normAutofit fontScale="90000"/>
-          </a:bodyPr>
+            <a:ext cx="10826151" cy="705928"/>
+          </a:xfrm>
+        </p:spPr>
+        <p:txBody>
+          <a:bodyPr/>
           <a:lstStyle/>
           <a:p>
             <a:r>
               <a:rPr lang="en-US" dirty="0"/>
-              <a:t>Vehicle Age Evaluation</a:t>
-            </a:r>
-          </a:p>
-        </p:txBody>
-      </p:sp>
-      <p:sp>
-        <p:nvSpPr>
-          <p:cNvPr id="3" name="Content Placeholder 2">
+              <a:t>Focusing on males (majority) - High Risk</a:t>
+            </a:r>
+          </a:p>
+        </p:txBody>
+      </p:sp>
+      <p:pic>
+        <p:nvPicPr>
+          <p:cNvPr id="5" name="Content Placeholder 4">
             <a:extLst>
               <a:ext uri="{FF2B5EF4-FFF2-40B4-BE49-F238E27FC236}">
-                <a16:creationId xmlns:a16="http://schemas.microsoft.com/office/drawing/2014/main" id="{F2FBA55F-B0C5-11A0-E0CB-4BE0FEA814BA}"/>
-              </a:ext>
-            </a:extLst>
-          </p:cNvPr>
-          <p:cNvSpPr>
-            <a:spLocks noGrp="1"/>
-          </p:cNvSpPr>
-          <p:nvPr>
-            <p:ph sz="half" idx="1"/>
-          </p:nvPr>
-        </p:nvSpPr>
-        <p:spPr>
-          <a:xfrm>
-            <a:off x="457199" y="1469346"/>
-            <a:ext cx="5350817" cy="4707617"/>
-          </a:xfrm>
-        </p:spPr>
-        <p:txBody>
-          <a:bodyPr/>
-          <a:lstStyle/>
-          <a:p>
-            <a:r>
-              <a:rPr lang="en-US" dirty="0"/>
-              <a:t>Category 3 (majority) - Low Risk</a:t>
-            </a:r>
-          </a:p>
-        </p:txBody>
-      </p:sp>
-      <p:sp>
-        <p:nvSpPr>
-          <p:cNvPr id="4" name="Content Placeholder 3">
-            <a:extLst>
-              <a:ext uri="{FF2B5EF4-FFF2-40B4-BE49-F238E27FC236}">
-                <a16:creationId xmlns:a16="http://schemas.microsoft.com/office/drawing/2014/main" id="{ED0534CC-B444-F212-E0FC-988B6FA0FBEF}"/>
-              </a:ext>
-            </a:extLst>
-          </p:cNvPr>
-          <p:cNvSpPr>
-            <a:spLocks noGrp="1"/>
-          </p:cNvSpPr>
-          <p:nvPr>
-            <p:ph sz="half" idx="2"/>
-          </p:nvPr>
-        </p:nvSpPr>
-        <p:spPr>
-          <a:xfrm>
-            <a:off x="5921528" y="1469346"/>
-            <a:ext cx="5271988" cy="4707617"/>
-          </a:xfrm>
-        </p:spPr>
-        <p:txBody>
-          <a:bodyPr/>
-          <a:lstStyle/>
-          <a:p>
-            <a:r>
-              <a:rPr lang="en-US" dirty="0"/>
-              <a:t>Category 4 (majority) - High Risk</a:t>
-            </a:r>
-          </a:p>
-        </p:txBody>
-      </p:sp>
-      <p:pic>
-        <p:nvPicPr>
-          <p:cNvPr id="6" name="Picture 5">
-            <a:extLst>
-              <a:ext uri="{FF2B5EF4-FFF2-40B4-BE49-F238E27FC236}">
-                <a16:creationId xmlns:a16="http://schemas.microsoft.com/office/drawing/2014/main" id="{02ED5AA1-4FF4-D098-12AE-6A8FF1FB551A}"/>
+                <a16:creationId xmlns:a16="http://schemas.microsoft.com/office/drawing/2014/main" id="{E2F3ACC3-47E0-78FD-BE1E-0CEEFA67D94A}"/>
               </a:ext>
             </a:extLst>
           </p:cNvPr>
           <p:cNvPicPr>
-            <a:picLocks noChangeAspect="1"/>
+            <a:picLocks noGrp="1" noChangeAspect="1"/>
           </p:cNvPicPr>
-          <p:nvPr/>
+          <p:nvPr>
+            <p:ph idx="1"/>
+          </p:nvPr>
         </p:nvPicPr>
         <p:blipFill>
           <a:blip r:embed="rId2"/>
@@ -7564,20 +8693,17 @@
         </p:blipFill>
         <p:spPr>
           <a:xfrm>
-            <a:off x="6096000" y="2078127"/>
-            <a:ext cx="5431076" cy="3490054"/>
-          </a:xfrm>
-          <a:prstGeom prst="rect">
-            <a:avLst/>
-          </a:prstGeom>
+            <a:off x="487194" y="1591812"/>
+            <a:ext cx="5350188" cy="3859102"/>
+          </a:xfrm>
         </p:spPr>
       </p:pic>
       <p:pic>
         <p:nvPicPr>
-          <p:cNvPr id="8" name="Picture 7">
+          <p:cNvPr id="7" name="Picture 6">
             <a:extLst>
               <a:ext uri="{FF2B5EF4-FFF2-40B4-BE49-F238E27FC236}">
-                <a16:creationId xmlns:a16="http://schemas.microsoft.com/office/drawing/2014/main" id="{973AC853-2276-98B8-B789-8CBB19E736B3}"/>
+                <a16:creationId xmlns:a16="http://schemas.microsoft.com/office/drawing/2014/main" id="{0980B469-4F6E-6686-8852-D15B15A74E07}"/>
               </a:ext>
             </a:extLst>
           </p:cNvPr>
@@ -7594,8 +8720,8 @@
         </p:blipFill>
         <p:spPr>
           <a:xfrm>
-            <a:off x="510803" y="2078127"/>
-            <a:ext cx="5297213" cy="3490054"/>
+            <a:off x="6159194" y="1591812"/>
+            <a:ext cx="5545612" cy="3859103"/>
           </a:xfrm>
           <a:prstGeom prst="rect">
             <a:avLst/>
@@ -7605,7 +8731,7 @@
     </p:spTree>
     <p:extLst>
       <p:ext uri="{BB962C8B-B14F-4D97-AF65-F5344CB8AC3E}">
-        <p14:creationId xmlns:p14="http://schemas.microsoft.com/office/powerpoint/2010/main" val="720308044"/>
+        <p14:creationId xmlns:p14="http://schemas.microsoft.com/office/powerpoint/2010/main" val="2851179346"/>
       </p:ext>
     </p:extLst>
   </p:cSld>
@@ -7790,7 +8916,7 @@
           <p:cNvPr id="2" name="Title 1">
             <a:extLst>
               <a:ext uri="{FF2B5EF4-FFF2-40B4-BE49-F238E27FC236}">
-                <a16:creationId xmlns:a16="http://schemas.microsoft.com/office/drawing/2014/main" id="{D72130D3-5C04-3F99-74FC-6DD3A4FB50C9}"/>
+                <a16:creationId xmlns:a16="http://schemas.microsoft.com/office/drawing/2014/main" id="{DF92D068-3F7C-26C2-88E1-CEB185D6DA5D}"/>
               </a:ext>
             </a:extLst>
           </p:cNvPr>
@@ -7803,8 +8929,8 @@
         </p:nvSpPr>
         <p:spPr>
           <a:xfrm>
-            <a:off x="397291" y="639793"/>
-            <a:ext cx="10922349" cy="709735"/>
+            <a:off x="457199" y="639793"/>
+            <a:ext cx="11197087" cy="697301"/>
           </a:xfrm>
         </p:spPr>
         <p:txBody>
@@ -7813,17 +8939,17 @@
           <a:p>
             <a:r>
               <a:rPr lang="en-US" dirty="0"/>
-              <a:t>Vehicle Value Evaluation</a:t>
+              <a:t>Focusing on males (majority) - High Risk</a:t>
             </a:r>
           </a:p>
         </p:txBody>
       </p:sp>
       <p:pic>
         <p:nvPicPr>
-          <p:cNvPr id="6" name="Content Placeholder 5">
+          <p:cNvPr id="9" name="Content Placeholder 8">
             <a:extLst>
               <a:ext uri="{FF2B5EF4-FFF2-40B4-BE49-F238E27FC236}">
-                <a16:creationId xmlns:a16="http://schemas.microsoft.com/office/drawing/2014/main" id="{B4BB10FF-031B-56D4-E63A-CDFC5A5A3373}"/>
+                <a16:creationId xmlns:a16="http://schemas.microsoft.com/office/drawing/2014/main" id="{93CE467A-B646-F33D-A717-8A6409E3FFCB}"/>
               </a:ext>
             </a:extLst>
           </p:cNvPr>
@@ -7831,7 +8957,7 @@
             <a:picLocks noGrp="1" noChangeAspect="1"/>
           </p:cNvPicPr>
           <p:nvPr>
-            <p:ph sz="half" idx="1"/>
+            <p:ph idx="1"/>
           </p:nvPr>
         </p:nvPicPr>
         <p:blipFill>
@@ -7842,44 +8968,15 @@
         </p:blipFill>
         <p:spPr>
           <a:xfrm>
-            <a:off x="457199" y="1948617"/>
-            <a:ext cx="5344511" cy="3389203"/>
-          </a:xfrm>
-        </p:spPr>
-      </p:pic>
-      <p:pic>
-        <p:nvPicPr>
-          <p:cNvPr id="8" name="Content Placeholder 7">
-            <a:extLst>
-              <a:ext uri="{FF2B5EF4-FFF2-40B4-BE49-F238E27FC236}">
-                <a16:creationId xmlns:a16="http://schemas.microsoft.com/office/drawing/2014/main" id="{59DA8EA8-26AE-9C5C-A80A-D390B3338D22}"/>
-              </a:ext>
-            </a:extLst>
-          </p:cNvPr>
-          <p:cNvPicPr>
-            <a:picLocks noGrp="1" noChangeAspect="1"/>
-          </p:cNvPicPr>
-          <p:nvPr>
-            <p:ph sz="half" idx="2"/>
-          </p:nvPr>
-        </p:nvPicPr>
-        <p:blipFill>
-          <a:blip r:embed="rId3"/>
-          <a:stretch>
-            <a:fillRect/>
-          </a:stretch>
-        </p:blipFill>
-        <p:spPr>
-          <a:xfrm>
-            <a:off x="6020467" y="1948618"/>
-            <a:ext cx="5299173" cy="3389202"/>
+            <a:off x="3233474" y="1606549"/>
+            <a:ext cx="5644536" cy="3787487"/>
           </a:xfrm>
         </p:spPr>
       </p:pic>
     </p:spTree>
     <p:extLst>
       <p:ext uri="{BB962C8B-B14F-4D97-AF65-F5344CB8AC3E}">
-        <p14:creationId xmlns:p14="http://schemas.microsoft.com/office/powerpoint/2010/main" val="2115324088"/>
+        <p14:creationId xmlns:p14="http://schemas.microsoft.com/office/powerpoint/2010/main" val="4079695075"/>
       </p:ext>
     </p:extLst>
   </p:cSld>
@@ -7911,7 +9008,7 @@
           <p:cNvPr id="2" name="Title 1">
             <a:extLst>
               <a:ext uri="{FF2B5EF4-FFF2-40B4-BE49-F238E27FC236}">
-                <a16:creationId xmlns:a16="http://schemas.microsoft.com/office/drawing/2014/main" id="{3422CF15-844A-4440-F34B-C5B3B27C3283}"/>
+                <a16:creationId xmlns:a16="http://schemas.microsoft.com/office/drawing/2014/main" id="{98796A30-8CE5-5B98-8490-C6B66183929F}"/>
               </a:ext>
             </a:extLst>
           </p:cNvPr>
@@ -7924,8 +9021,8 @@
         </p:nvSpPr>
         <p:spPr>
           <a:xfrm>
-            <a:off x="457199" y="639794"/>
-            <a:ext cx="10975953" cy="684510"/>
+            <a:off x="457200" y="639794"/>
+            <a:ext cx="10912764" cy="614575"/>
           </a:xfrm>
         </p:spPr>
         <p:txBody>
@@ -7934,17 +9031,17 @@
           <a:p>
             <a:r>
               <a:rPr lang="en-US" dirty="0"/>
-              <a:t>Vehicle Value Evaluation</a:t>
+              <a:t>Credit Score vs Total Claim Amounts</a:t>
             </a:r>
           </a:p>
         </p:txBody>
       </p:sp>
       <p:pic>
         <p:nvPicPr>
-          <p:cNvPr id="7" name="Content Placeholder 6">
+          <p:cNvPr id="9" name="Content Placeholder 8">
             <a:extLst>
               <a:ext uri="{FF2B5EF4-FFF2-40B4-BE49-F238E27FC236}">
-                <a16:creationId xmlns:a16="http://schemas.microsoft.com/office/drawing/2014/main" id="{FB51D099-D7EF-B137-EFC6-6ACAE0636A16}"/>
+                <a16:creationId xmlns:a16="http://schemas.microsoft.com/office/drawing/2014/main" id="{69061435-B030-168A-80AE-6E30F99C75DF}"/>
               </a:ext>
             </a:extLst>
           </p:cNvPr>
@@ -7963,15 +9060,45 @@
         </p:blipFill>
         <p:spPr>
           <a:xfrm>
-            <a:off x="2420154" y="1601777"/>
-            <a:ext cx="6566191" cy="4002098"/>
-          </a:xfrm>
+            <a:off x="457200" y="1682967"/>
+            <a:ext cx="5435600" cy="3492066"/>
+          </a:xfrm>
+        </p:spPr>
+      </p:pic>
+      <p:pic>
+        <p:nvPicPr>
+          <p:cNvPr id="11" name="Picture 10">
+            <a:extLst>
+              <a:ext uri="{FF2B5EF4-FFF2-40B4-BE49-F238E27FC236}">
+                <a16:creationId xmlns:a16="http://schemas.microsoft.com/office/drawing/2014/main" id="{6A990812-3100-7C4A-45FD-EFC0940F5B47}"/>
+              </a:ext>
+            </a:extLst>
+          </p:cNvPr>
+          <p:cNvPicPr>
+            <a:picLocks noChangeAspect="1"/>
+          </p:cNvPicPr>
+          <p:nvPr/>
+        </p:nvPicPr>
+        <p:blipFill>
+          <a:blip r:embed="rId3"/>
+          <a:stretch>
+            <a:fillRect/>
+          </a:stretch>
+        </p:blipFill>
+        <p:spPr>
+          <a:xfrm>
+            <a:off x="6143975" y="1682967"/>
+            <a:ext cx="5225989" cy="3492066"/>
+          </a:xfrm>
+          <a:prstGeom prst="rect">
+            <a:avLst/>
+          </a:prstGeom>
         </p:spPr>
       </p:pic>
     </p:spTree>
     <p:extLst>
       <p:ext uri="{BB962C8B-B14F-4D97-AF65-F5344CB8AC3E}">
-        <p14:creationId xmlns:p14="http://schemas.microsoft.com/office/powerpoint/2010/main" val="3714379268"/>
+        <p14:creationId xmlns:p14="http://schemas.microsoft.com/office/powerpoint/2010/main" val="2404060174"/>
       </p:ext>
     </p:extLst>
   </p:cSld>
@@ -8003,6 +9130,502 @@
           <p:cNvPr id="2" name="Title 1">
             <a:extLst>
               <a:ext uri="{FF2B5EF4-FFF2-40B4-BE49-F238E27FC236}">
+                <a16:creationId xmlns:a16="http://schemas.microsoft.com/office/drawing/2014/main" id="{B62FCE0A-C12F-F4F9-6E7E-89F151227D4F}"/>
+              </a:ext>
+            </a:extLst>
+          </p:cNvPr>
+          <p:cNvSpPr>
+            <a:spLocks noGrp="1"/>
+          </p:cNvSpPr>
+          <p:nvPr>
+            <p:ph type="title"/>
+          </p:nvPr>
+        </p:nvSpPr>
+        <p:spPr>
+          <a:xfrm>
+            <a:off x="457199" y="639794"/>
+            <a:ext cx="11152909" cy="745662"/>
+          </a:xfrm>
+        </p:spPr>
+        <p:txBody>
+          <a:bodyPr/>
+          <a:lstStyle/>
+          <a:p>
+            <a:r>
+              <a:rPr lang="en-US" dirty="0"/>
+              <a:t>Traffic Index vs Claim Risk Categories</a:t>
+            </a:r>
+          </a:p>
+        </p:txBody>
+      </p:sp>
+      <p:pic>
+        <p:nvPicPr>
+          <p:cNvPr id="5" name="Content Placeholder 4">
+            <a:extLst>
+              <a:ext uri="{FF2B5EF4-FFF2-40B4-BE49-F238E27FC236}">
+                <a16:creationId xmlns:a16="http://schemas.microsoft.com/office/drawing/2014/main" id="{4AB0D78B-C892-65CB-37F7-9C63E2041DCF}"/>
+              </a:ext>
+            </a:extLst>
+          </p:cNvPr>
+          <p:cNvPicPr>
+            <a:picLocks noGrp="1" noChangeAspect="1"/>
+          </p:cNvPicPr>
+          <p:nvPr>
+            <p:ph idx="1"/>
+          </p:nvPr>
+        </p:nvPicPr>
+        <p:blipFill>
+          <a:blip r:embed="rId2"/>
+          <a:stretch>
+            <a:fillRect/>
+          </a:stretch>
+        </p:blipFill>
+        <p:spPr>
+          <a:xfrm>
+            <a:off x="2476072" y="1550988"/>
+            <a:ext cx="6392365" cy="3935412"/>
+          </a:xfrm>
+        </p:spPr>
+      </p:pic>
+    </p:spTree>
+    <p:extLst>
+      <p:ext uri="{BB962C8B-B14F-4D97-AF65-F5344CB8AC3E}">
+        <p14:creationId xmlns:p14="http://schemas.microsoft.com/office/powerpoint/2010/main" val="40079428"/>
+      </p:ext>
+    </p:extLst>
+  </p:cSld>
+  <p:clrMapOvr>
+    <a:masterClrMapping/>
+  </p:clrMapOvr>
+</p:sld>
+</file>
+
+<file path=ppt/slides/slide33.xml><?xml version="1.0" encoding="utf-8"?>
+<p:sld xmlns:a="http://schemas.openxmlformats.org/drawingml/2006/main" xmlns:r="http://schemas.openxmlformats.org/officeDocument/2006/relationships" xmlns:p="http://schemas.openxmlformats.org/presentationml/2006/main">
+  <p:cSld>
+    <p:spTree>
+      <p:nvGrpSpPr>
+        <p:cNvPr id="1" name=""/>
+        <p:cNvGrpSpPr/>
+        <p:nvPr/>
+      </p:nvGrpSpPr>
+      <p:grpSpPr>
+        <a:xfrm>
+          <a:off x="0" y="0"/>
+          <a:ext cx="0" cy="0"/>
+          <a:chOff x="0" y="0"/>
+          <a:chExt cx="0" cy="0"/>
+        </a:xfrm>
+      </p:grpSpPr>
+      <p:sp>
+        <p:nvSpPr>
+          <p:cNvPr id="2" name="Title 1">
+            <a:extLst>
+              <a:ext uri="{FF2B5EF4-FFF2-40B4-BE49-F238E27FC236}">
+                <a16:creationId xmlns:a16="http://schemas.microsoft.com/office/drawing/2014/main" id="{8C465EDD-AE2C-EEB8-91B5-C20D0FD225C3}"/>
+              </a:ext>
+            </a:extLst>
+          </p:cNvPr>
+          <p:cNvSpPr>
+            <a:spLocks noGrp="1"/>
+          </p:cNvSpPr>
+          <p:nvPr>
+            <p:ph type="title"/>
+          </p:nvPr>
+        </p:nvSpPr>
+        <p:spPr>
+          <a:xfrm>
+            <a:off x="457199" y="639794"/>
+            <a:ext cx="11411081" cy="596224"/>
+          </a:xfrm>
+        </p:spPr>
+        <p:txBody>
+          <a:bodyPr>
+            <a:normAutofit fontScale="90000"/>
+          </a:bodyPr>
+          <a:lstStyle/>
+          <a:p>
+            <a:r>
+              <a:rPr lang="en-US" dirty="0"/>
+              <a:t>Vehicle Age Evaluation</a:t>
+            </a:r>
+          </a:p>
+        </p:txBody>
+      </p:sp>
+      <p:sp>
+        <p:nvSpPr>
+          <p:cNvPr id="3" name="Content Placeholder 2">
+            <a:extLst>
+              <a:ext uri="{FF2B5EF4-FFF2-40B4-BE49-F238E27FC236}">
+                <a16:creationId xmlns:a16="http://schemas.microsoft.com/office/drawing/2014/main" id="{F2FBA55F-B0C5-11A0-E0CB-4BE0FEA814BA}"/>
+              </a:ext>
+            </a:extLst>
+          </p:cNvPr>
+          <p:cNvSpPr>
+            <a:spLocks noGrp="1"/>
+          </p:cNvSpPr>
+          <p:nvPr>
+            <p:ph sz="half" idx="1"/>
+          </p:nvPr>
+        </p:nvSpPr>
+        <p:spPr>
+          <a:xfrm>
+            <a:off x="457199" y="1469346"/>
+            <a:ext cx="5350817" cy="4707617"/>
+          </a:xfrm>
+        </p:spPr>
+        <p:txBody>
+          <a:bodyPr/>
+          <a:lstStyle/>
+          <a:p>
+            <a:r>
+              <a:rPr lang="en-US" dirty="0"/>
+              <a:t>Category 3 (majority) - Low Risk</a:t>
+            </a:r>
+          </a:p>
+        </p:txBody>
+      </p:sp>
+      <p:sp>
+        <p:nvSpPr>
+          <p:cNvPr id="4" name="Content Placeholder 3">
+            <a:extLst>
+              <a:ext uri="{FF2B5EF4-FFF2-40B4-BE49-F238E27FC236}">
+                <a16:creationId xmlns:a16="http://schemas.microsoft.com/office/drawing/2014/main" id="{ED0534CC-B444-F212-E0FC-988B6FA0FBEF}"/>
+              </a:ext>
+            </a:extLst>
+          </p:cNvPr>
+          <p:cNvSpPr>
+            <a:spLocks noGrp="1"/>
+          </p:cNvSpPr>
+          <p:nvPr>
+            <p:ph sz="half" idx="2"/>
+          </p:nvPr>
+        </p:nvSpPr>
+        <p:spPr>
+          <a:xfrm>
+            <a:off x="5921528" y="1469346"/>
+            <a:ext cx="5271988" cy="4707617"/>
+          </a:xfrm>
+        </p:spPr>
+        <p:txBody>
+          <a:bodyPr/>
+          <a:lstStyle/>
+          <a:p>
+            <a:r>
+              <a:rPr lang="en-US" dirty="0"/>
+              <a:t>Category 4 (majority) - High Risk</a:t>
+            </a:r>
+          </a:p>
+        </p:txBody>
+      </p:sp>
+      <p:pic>
+        <p:nvPicPr>
+          <p:cNvPr id="6" name="Picture 5">
+            <a:extLst>
+              <a:ext uri="{FF2B5EF4-FFF2-40B4-BE49-F238E27FC236}">
+                <a16:creationId xmlns:a16="http://schemas.microsoft.com/office/drawing/2014/main" id="{02ED5AA1-4FF4-D098-12AE-6A8FF1FB551A}"/>
+              </a:ext>
+            </a:extLst>
+          </p:cNvPr>
+          <p:cNvPicPr>
+            <a:picLocks noChangeAspect="1"/>
+          </p:cNvPicPr>
+          <p:nvPr/>
+        </p:nvPicPr>
+        <p:blipFill>
+          <a:blip r:embed="rId2"/>
+          <a:stretch>
+            <a:fillRect/>
+          </a:stretch>
+        </p:blipFill>
+        <p:spPr>
+          <a:xfrm>
+            <a:off x="6096000" y="2078127"/>
+            <a:ext cx="5431076" cy="3490054"/>
+          </a:xfrm>
+          <a:prstGeom prst="rect">
+            <a:avLst/>
+          </a:prstGeom>
+        </p:spPr>
+      </p:pic>
+      <p:pic>
+        <p:nvPicPr>
+          <p:cNvPr id="8" name="Picture 7">
+            <a:extLst>
+              <a:ext uri="{FF2B5EF4-FFF2-40B4-BE49-F238E27FC236}">
+                <a16:creationId xmlns:a16="http://schemas.microsoft.com/office/drawing/2014/main" id="{973AC853-2276-98B8-B789-8CBB19E736B3}"/>
+              </a:ext>
+            </a:extLst>
+          </p:cNvPr>
+          <p:cNvPicPr>
+            <a:picLocks noChangeAspect="1"/>
+          </p:cNvPicPr>
+          <p:nvPr/>
+        </p:nvPicPr>
+        <p:blipFill>
+          <a:blip r:embed="rId3"/>
+          <a:stretch>
+            <a:fillRect/>
+          </a:stretch>
+        </p:blipFill>
+        <p:spPr>
+          <a:xfrm>
+            <a:off x="510803" y="2078127"/>
+            <a:ext cx="5297213" cy="3490054"/>
+          </a:xfrm>
+          <a:prstGeom prst="rect">
+            <a:avLst/>
+          </a:prstGeom>
+        </p:spPr>
+      </p:pic>
+    </p:spTree>
+    <p:extLst>
+      <p:ext uri="{BB962C8B-B14F-4D97-AF65-F5344CB8AC3E}">
+        <p14:creationId xmlns:p14="http://schemas.microsoft.com/office/powerpoint/2010/main" val="720308044"/>
+      </p:ext>
+    </p:extLst>
+  </p:cSld>
+  <p:clrMapOvr>
+    <a:masterClrMapping/>
+  </p:clrMapOvr>
+</p:sld>
+</file>
+
+<file path=ppt/slides/slide34.xml><?xml version="1.0" encoding="utf-8"?>
+<p:sld xmlns:a="http://schemas.openxmlformats.org/drawingml/2006/main" xmlns:r="http://schemas.openxmlformats.org/officeDocument/2006/relationships" xmlns:p="http://schemas.openxmlformats.org/presentationml/2006/main">
+  <p:cSld>
+    <p:spTree>
+      <p:nvGrpSpPr>
+        <p:cNvPr id="1" name=""/>
+        <p:cNvGrpSpPr/>
+        <p:nvPr/>
+      </p:nvGrpSpPr>
+      <p:grpSpPr>
+        <a:xfrm>
+          <a:off x="0" y="0"/>
+          <a:ext cx="0" cy="0"/>
+          <a:chOff x="0" y="0"/>
+          <a:chExt cx="0" cy="0"/>
+        </a:xfrm>
+      </p:grpSpPr>
+      <p:sp>
+        <p:nvSpPr>
+          <p:cNvPr id="2" name="Title 1">
+            <a:extLst>
+              <a:ext uri="{FF2B5EF4-FFF2-40B4-BE49-F238E27FC236}">
+                <a16:creationId xmlns:a16="http://schemas.microsoft.com/office/drawing/2014/main" id="{D72130D3-5C04-3F99-74FC-6DD3A4FB50C9}"/>
+              </a:ext>
+            </a:extLst>
+          </p:cNvPr>
+          <p:cNvSpPr>
+            <a:spLocks noGrp="1"/>
+          </p:cNvSpPr>
+          <p:nvPr>
+            <p:ph type="title"/>
+          </p:nvPr>
+        </p:nvSpPr>
+        <p:spPr>
+          <a:xfrm>
+            <a:off x="397291" y="639793"/>
+            <a:ext cx="10922349" cy="709735"/>
+          </a:xfrm>
+        </p:spPr>
+        <p:txBody>
+          <a:bodyPr/>
+          <a:lstStyle/>
+          <a:p>
+            <a:r>
+              <a:rPr lang="en-US" dirty="0"/>
+              <a:t>Vehicle Value Evaluation</a:t>
+            </a:r>
+          </a:p>
+        </p:txBody>
+      </p:sp>
+      <p:pic>
+        <p:nvPicPr>
+          <p:cNvPr id="6" name="Content Placeholder 5">
+            <a:extLst>
+              <a:ext uri="{FF2B5EF4-FFF2-40B4-BE49-F238E27FC236}">
+                <a16:creationId xmlns:a16="http://schemas.microsoft.com/office/drawing/2014/main" id="{B4BB10FF-031B-56D4-E63A-CDFC5A5A3373}"/>
+              </a:ext>
+            </a:extLst>
+          </p:cNvPr>
+          <p:cNvPicPr>
+            <a:picLocks noGrp="1" noChangeAspect="1"/>
+          </p:cNvPicPr>
+          <p:nvPr>
+            <p:ph sz="half" idx="1"/>
+          </p:nvPr>
+        </p:nvPicPr>
+        <p:blipFill>
+          <a:blip r:embed="rId2"/>
+          <a:stretch>
+            <a:fillRect/>
+          </a:stretch>
+        </p:blipFill>
+        <p:spPr>
+          <a:xfrm>
+            <a:off x="457199" y="1948617"/>
+            <a:ext cx="5344511" cy="3389203"/>
+          </a:xfrm>
+        </p:spPr>
+      </p:pic>
+      <p:pic>
+        <p:nvPicPr>
+          <p:cNvPr id="8" name="Content Placeholder 7">
+            <a:extLst>
+              <a:ext uri="{FF2B5EF4-FFF2-40B4-BE49-F238E27FC236}">
+                <a16:creationId xmlns:a16="http://schemas.microsoft.com/office/drawing/2014/main" id="{59DA8EA8-26AE-9C5C-A80A-D390B3338D22}"/>
+              </a:ext>
+            </a:extLst>
+          </p:cNvPr>
+          <p:cNvPicPr>
+            <a:picLocks noGrp="1" noChangeAspect="1"/>
+          </p:cNvPicPr>
+          <p:nvPr>
+            <p:ph sz="half" idx="2"/>
+          </p:nvPr>
+        </p:nvPicPr>
+        <p:blipFill>
+          <a:blip r:embed="rId3"/>
+          <a:stretch>
+            <a:fillRect/>
+          </a:stretch>
+        </p:blipFill>
+        <p:spPr>
+          <a:xfrm>
+            <a:off x="6020467" y="1948618"/>
+            <a:ext cx="5299173" cy="3389202"/>
+          </a:xfrm>
+        </p:spPr>
+      </p:pic>
+    </p:spTree>
+    <p:extLst>
+      <p:ext uri="{BB962C8B-B14F-4D97-AF65-F5344CB8AC3E}">
+        <p14:creationId xmlns:p14="http://schemas.microsoft.com/office/powerpoint/2010/main" val="2115324088"/>
+      </p:ext>
+    </p:extLst>
+  </p:cSld>
+  <p:clrMapOvr>
+    <a:masterClrMapping/>
+  </p:clrMapOvr>
+</p:sld>
+</file>
+
+<file path=ppt/slides/slide35.xml><?xml version="1.0" encoding="utf-8"?>
+<p:sld xmlns:a="http://schemas.openxmlformats.org/drawingml/2006/main" xmlns:r="http://schemas.openxmlformats.org/officeDocument/2006/relationships" xmlns:p="http://schemas.openxmlformats.org/presentationml/2006/main">
+  <p:cSld>
+    <p:spTree>
+      <p:nvGrpSpPr>
+        <p:cNvPr id="1" name=""/>
+        <p:cNvGrpSpPr/>
+        <p:nvPr/>
+      </p:nvGrpSpPr>
+      <p:grpSpPr>
+        <a:xfrm>
+          <a:off x="0" y="0"/>
+          <a:ext cx="0" cy="0"/>
+          <a:chOff x="0" y="0"/>
+          <a:chExt cx="0" cy="0"/>
+        </a:xfrm>
+      </p:grpSpPr>
+      <p:sp>
+        <p:nvSpPr>
+          <p:cNvPr id="2" name="Title 1">
+            <a:extLst>
+              <a:ext uri="{FF2B5EF4-FFF2-40B4-BE49-F238E27FC236}">
+                <a16:creationId xmlns:a16="http://schemas.microsoft.com/office/drawing/2014/main" id="{3422CF15-844A-4440-F34B-C5B3B27C3283}"/>
+              </a:ext>
+            </a:extLst>
+          </p:cNvPr>
+          <p:cNvSpPr>
+            <a:spLocks noGrp="1"/>
+          </p:cNvSpPr>
+          <p:nvPr>
+            <p:ph type="title"/>
+          </p:nvPr>
+        </p:nvSpPr>
+        <p:spPr>
+          <a:xfrm>
+            <a:off x="457199" y="639794"/>
+            <a:ext cx="10975953" cy="684510"/>
+          </a:xfrm>
+        </p:spPr>
+        <p:txBody>
+          <a:bodyPr/>
+          <a:lstStyle/>
+          <a:p>
+            <a:r>
+              <a:rPr lang="en-US" dirty="0"/>
+              <a:t>Vehicle Value Evaluation</a:t>
+            </a:r>
+          </a:p>
+        </p:txBody>
+      </p:sp>
+      <p:pic>
+        <p:nvPicPr>
+          <p:cNvPr id="7" name="Content Placeholder 6">
+            <a:extLst>
+              <a:ext uri="{FF2B5EF4-FFF2-40B4-BE49-F238E27FC236}">
+                <a16:creationId xmlns:a16="http://schemas.microsoft.com/office/drawing/2014/main" id="{FB51D099-D7EF-B137-EFC6-6ACAE0636A16}"/>
+              </a:ext>
+            </a:extLst>
+          </p:cNvPr>
+          <p:cNvPicPr>
+            <a:picLocks noGrp="1" noChangeAspect="1"/>
+          </p:cNvPicPr>
+          <p:nvPr>
+            <p:ph idx="1"/>
+          </p:nvPr>
+        </p:nvPicPr>
+        <p:blipFill>
+          <a:blip r:embed="rId2"/>
+          <a:stretch>
+            <a:fillRect/>
+          </a:stretch>
+        </p:blipFill>
+        <p:spPr>
+          <a:xfrm>
+            <a:off x="2420154" y="1601777"/>
+            <a:ext cx="6566191" cy="4002098"/>
+          </a:xfrm>
+        </p:spPr>
+      </p:pic>
+    </p:spTree>
+    <p:extLst>
+      <p:ext uri="{BB962C8B-B14F-4D97-AF65-F5344CB8AC3E}">
+        <p14:creationId xmlns:p14="http://schemas.microsoft.com/office/powerpoint/2010/main" val="3714379268"/>
+      </p:ext>
+    </p:extLst>
+  </p:cSld>
+  <p:clrMapOvr>
+    <a:masterClrMapping/>
+  </p:clrMapOvr>
+</p:sld>
+</file>
+
+<file path=ppt/slides/slide36.xml><?xml version="1.0" encoding="utf-8"?>
+<p:sld xmlns:a="http://schemas.openxmlformats.org/drawingml/2006/main" xmlns:r="http://schemas.openxmlformats.org/officeDocument/2006/relationships" xmlns:p="http://schemas.openxmlformats.org/presentationml/2006/main">
+  <p:cSld>
+    <p:spTree>
+      <p:nvGrpSpPr>
+        <p:cNvPr id="1" name=""/>
+        <p:cNvGrpSpPr/>
+        <p:nvPr/>
+      </p:nvGrpSpPr>
+      <p:grpSpPr>
+        <a:xfrm>
+          <a:off x="0" y="0"/>
+          <a:ext cx="0" cy="0"/>
+          <a:chOff x="0" y="0"/>
+          <a:chExt cx="0" cy="0"/>
+        </a:xfrm>
+      </p:grpSpPr>
+      <p:sp>
+        <p:nvSpPr>
+          <p:cNvPr id="2" name="Title 1">
+            <a:extLst>
+              <a:ext uri="{FF2B5EF4-FFF2-40B4-BE49-F238E27FC236}">
                 <a16:creationId xmlns:a16="http://schemas.microsoft.com/office/drawing/2014/main" id="{DC83FB2E-82E2-3F19-A148-4F45CAAB45F5}"/>
               </a:ext>
             </a:extLst>
@@ -8104,7 +9727,492 @@
 </p:sld>
 </file>
 
-<file path=ppt/slides/slide33.xml><?xml version="1.0" encoding="utf-8"?>
+<file path=ppt/slides/slide37.xml><?xml version="1.0" encoding="utf-8"?>
+<p:sld xmlns:a="http://schemas.openxmlformats.org/drawingml/2006/main" xmlns:r="http://schemas.openxmlformats.org/officeDocument/2006/relationships" xmlns:p="http://schemas.openxmlformats.org/presentationml/2006/main">
+  <p:cSld>
+    <p:spTree>
+      <p:nvGrpSpPr>
+        <p:cNvPr id="1" name=""/>
+        <p:cNvGrpSpPr/>
+        <p:nvPr/>
+      </p:nvGrpSpPr>
+      <p:grpSpPr>
+        <a:xfrm>
+          <a:off x="0" y="0"/>
+          <a:ext cx="0" cy="0"/>
+          <a:chOff x="0" y="0"/>
+          <a:chExt cx="0" cy="0"/>
+        </a:xfrm>
+      </p:grpSpPr>
+      <p:sp>
+        <p:nvSpPr>
+          <p:cNvPr id="2" name="Title 1">
+            <a:extLst>
+              <a:ext uri="{FF2B5EF4-FFF2-40B4-BE49-F238E27FC236}">
+                <a16:creationId xmlns:a16="http://schemas.microsoft.com/office/drawing/2014/main" id="{EAC04FA7-568E-D2B5-D519-A0D2FC58FC6F}"/>
+              </a:ext>
+            </a:extLst>
+          </p:cNvPr>
+          <p:cNvSpPr>
+            <a:spLocks noGrp="1"/>
+          </p:cNvSpPr>
+          <p:nvPr>
+            <p:ph type="title"/>
+          </p:nvPr>
+        </p:nvSpPr>
+        <p:spPr>
+          <a:xfrm>
+            <a:off x="457200" y="639793"/>
+            <a:ext cx="11214340" cy="697301"/>
+          </a:xfrm>
+        </p:spPr>
+        <p:txBody>
+          <a:bodyPr/>
+          <a:lstStyle/>
+          <a:p>
+            <a:r>
+              <a:rPr lang="en-US" sz="4000" b="1" dirty="0"/>
+              <a:t>LightGBM Model (SMOTE data)</a:t>
+            </a:r>
+            <a:endParaRPr lang="en-US" dirty="0"/>
+          </a:p>
+        </p:txBody>
+      </p:sp>
+      <p:pic>
+        <p:nvPicPr>
+          <p:cNvPr id="5" name="Content Placeholder 4">
+            <a:extLst>
+              <a:ext uri="{FF2B5EF4-FFF2-40B4-BE49-F238E27FC236}">
+                <a16:creationId xmlns:a16="http://schemas.microsoft.com/office/drawing/2014/main" id="{7033CAB6-D4D8-3744-A0B8-1DF1FDDC3CD3}"/>
+              </a:ext>
+            </a:extLst>
+          </p:cNvPr>
+          <p:cNvPicPr>
+            <a:picLocks noGrp="1" noChangeAspect="1"/>
+          </p:cNvPicPr>
+          <p:nvPr>
+            <p:ph idx="1"/>
+          </p:nvPr>
+        </p:nvPicPr>
+        <p:blipFill>
+          <a:blip r:embed="rId2"/>
+          <a:stretch>
+            <a:fillRect/>
+          </a:stretch>
+        </p:blipFill>
+        <p:spPr>
+          <a:xfrm>
+            <a:off x="457200" y="1396969"/>
+            <a:ext cx="5072132" cy="4546631"/>
+          </a:xfrm>
+        </p:spPr>
+      </p:pic>
+      <p:pic>
+        <p:nvPicPr>
+          <p:cNvPr id="7" name="Picture 6">
+            <a:extLst>
+              <a:ext uri="{FF2B5EF4-FFF2-40B4-BE49-F238E27FC236}">
+                <a16:creationId xmlns:a16="http://schemas.microsoft.com/office/drawing/2014/main" id="{A9B4F161-9361-819C-FA02-6F6B89DEAC04}"/>
+              </a:ext>
+            </a:extLst>
+          </p:cNvPr>
+          <p:cNvPicPr>
+            <a:picLocks noChangeAspect="1"/>
+          </p:cNvPicPr>
+          <p:nvPr/>
+        </p:nvPicPr>
+        <p:blipFill>
+          <a:blip r:embed="rId3"/>
+          <a:stretch>
+            <a:fillRect/>
+          </a:stretch>
+        </p:blipFill>
+        <p:spPr>
+          <a:xfrm>
+            <a:off x="5814203" y="1384301"/>
+            <a:ext cx="5072132" cy="4546631"/>
+          </a:xfrm>
+          <a:prstGeom prst="rect">
+            <a:avLst/>
+          </a:prstGeom>
+        </p:spPr>
+      </p:pic>
+    </p:spTree>
+    <p:extLst>
+      <p:ext uri="{BB962C8B-B14F-4D97-AF65-F5344CB8AC3E}">
+        <p14:creationId xmlns:p14="http://schemas.microsoft.com/office/powerpoint/2010/main" val="390363813"/>
+      </p:ext>
+    </p:extLst>
+  </p:cSld>
+  <p:clrMapOvr>
+    <a:masterClrMapping/>
+  </p:clrMapOvr>
+</p:sld>
+</file>
+
+<file path=ppt/slides/slide38.xml><?xml version="1.0" encoding="utf-8"?>
+<p:sld xmlns:a="http://schemas.openxmlformats.org/drawingml/2006/main" xmlns:r="http://schemas.openxmlformats.org/officeDocument/2006/relationships" xmlns:p="http://schemas.openxmlformats.org/presentationml/2006/main">
+  <p:cSld>
+    <p:spTree>
+      <p:nvGrpSpPr>
+        <p:cNvPr id="1" name=""/>
+        <p:cNvGrpSpPr/>
+        <p:nvPr/>
+      </p:nvGrpSpPr>
+      <p:grpSpPr>
+        <a:xfrm>
+          <a:off x="0" y="0"/>
+          <a:ext cx="0" cy="0"/>
+          <a:chOff x="0" y="0"/>
+          <a:chExt cx="0" cy="0"/>
+        </a:xfrm>
+      </p:grpSpPr>
+      <p:sp>
+        <p:nvSpPr>
+          <p:cNvPr id="2" name="Title 1">
+            <a:extLst>
+              <a:ext uri="{FF2B5EF4-FFF2-40B4-BE49-F238E27FC236}">
+                <a16:creationId xmlns:a16="http://schemas.microsoft.com/office/drawing/2014/main" id="{E066C3B8-9836-08DE-B4C0-D5E87B4831B3}"/>
+              </a:ext>
+            </a:extLst>
+          </p:cNvPr>
+          <p:cNvSpPr>
+            <a:spLocks noGrp="1"/>
+          </p:cNvSpPr>
+          <p:nvPr>
+            <p:ph type="title"/>
+          </p:nvPr>
+        </p:nvSpPr>
+        <p:spPr>
+          <a:xfrm>
+            <a:off x="457200" y="639794"/>
+            <a:ext cx="11266098" cy="614576"/>
+          </a:xfrm>
+        </p:spPr>
+        <p:txBody>
+          <a:bodyPr/>
+          <a:lstStyle/>
+          <a:p>
+            <a:r>
+              <a:rPr lang="en-US" dirty="0"/>
+              <a:t>LightGBM Model (SMOTE data)</a:t>
+            </a:r>
+          </a:p>
+        </p:txBody>
+      </p:sp>
+      <p:pic>
+        <p:nvPicPr>
+          <p:cNvPr id="5" name="Content Placeholder 4">
+            <a:extLst>
+              <a:ext uri="{FF2B5EF4-FFF2-40B4-BE49-F238E27FC236}">
+                <a16:creationId xmlns:a16="http://schemas.microsoft.com/office/drawing/2014/main" id="{48081990-0C19-13E8-776F-B105CC797E9C}"/>
+              </a:ext>
+            </a:extLst>
+          </p:cNvPr>
+          <p:cNvPicPr>
+            <a:picLocks noGrp="1" noChangeAspect="1"/>
+          </p:cNvPicPr>
+          <p:nvPr>
+            <p:ph idx="1"/>
+          </p:nvPr>
+        </p:nvPicPr>
+        <p:blipFill>
+          <a:blip r:embed="rId2"/>
+          <a:stretch>
+            <a:fillRect/>
+          </a:stretch>
+        </p:blipFill>
+        <p:spPr>
+          <a:xfrm>
+            <a:off x="457200" y="1423358"/>
+            <a:ext cx="5164951" cy="4477110"/>
+          </a:xfrm>
+        </p:spPr>
+      </p:pic>
+      <p:pic>
+        <p:nvPicPr>
+          <p:cNvPr id="7" name="Picture 6">
+            <a:extLst>
+              <a:ext uri="{FF2B5EF4-FFF2-40B4-BE49-F238E27FC236}">
+                <a16:creationId xmlns:a16="http://schemas.microsoft.com/office/drawing/2014/main" id="{7BA8FF47-6B21-B8AF-469A-156A5A0A72C9}"/>
+              </a:ext>
+            </a:extLst>
+          </p:cNvPr>
+          <p:cNvPicPr>
+            <a:picLocks noChangeAspect="1"/>
+          </p:cNvPicPr>
+          <p:nvPr/>
+        </p:nvPicPr>
+        <p:blipFill>
+          <a:blip r:embed="rId3"/>
+          <a:stretch>
+            <a:fillRect/>
+          </a:stretch>
+        </p:blipFill>
+        <p:spPr>
+          <a:xfrm>
+            <a:off x="5970136" y="1404619"/>
+            <a:ext cx="5164952" cy="4495849"/>
+          </a:xfrm>
+          <a:prstGeom prst="rect">
+            <a:avLst/>
+          </a:prstGeom>
+        </p:spPr>
+      </p:pic>
+    </p:spTree>
+    <p:extLst>
+      <p:ext uri="{BB962C8B-B14F-4D97-AF65-F5344CB8AC3E}">
+        <p14:creationId xmlns:p14="http://schemas.microsoft.com/office/powerpoint/2010/main" val="4146596824"/>
+      </p:ext>
+    </p:extLst>
+  </p:cSld>
+  <p:clrMapOvr>
+    <a:masterClrMapping/>
+  </p:clrMapOvr>
+</p:sld>
+</file>
+
+<file path=ppt/slides/slide39.xml><?xml version="1.0" encoding="utf-8"?>
+<p:sld xmlns:a="http://schemas.openxmlformats.org/drawingml/2006/main" xmlns:r="http://schemas.openxmlformats.org/officeDocument/2006/relationships" xmlns:p="http://schemas.openxmlformats.org/presentationml/2006/main">
+  <p:cSld>
+    <p:spTree>
+      <p:nvGrpSpPr>
+        <p:cNvPr id="1" name=""/>
+        <p:cNvGrpSpPr/>
+        <p:nvPr/>
+      </p:nvGrpSpPr>
+      <p:grpSpPr>
+        <a:xfrm>
+          <a:off x="0" y="0"/>
+          <a:ext cx="0" cy="0"/>
+          <a:chOff x="0" y="0"/>
+          <a:chExt cx="0" cy="0"/>
+        </a:xfrm>
+      </p:grpSpPr>
+      <p:sp>
+        <p:nvSpPr>
+          <p:cNvPr id="2" name="Title 1">
+            <a:extLst>
+              <a:ext uri="{FF2B5EF4-FFF2-40B4-BE49-F238E27FC236}">
+                <a16:creationId xmlns:a16="http://schemas.microsoft.com/office/drawing/2014/main" id="{66849788-F7F3-8325-402F-CD7A9E398682}"/>
+              </a:ext>
+            </a:extLst>
+          </p:cNvPr>
+          <p:cNvSpPr>
+            <a:spLocks noGrp="1"/>
+          </p:cNvSpPr>
+          <p:nvPr>
+            <p:ph type="title"/>
+          </p:nvPr>
+        </p:nvSpPr>
+        <p:spPr>
+          <a:xfrm>
+            <a:off x="457200" y="639793"/>
+            <a:ext cx="10096500" cy="688675"/>
+          </a:xfrm>
+        </p:spPr>
+        <p:txBody>
+          <a:bodyPr/>
+          <a:lstStyle/>
+          <a:p>
+            <a:r>
+              <a:rPr lang="en-US" dirty="0"/>
+              <a:t>Feature Importance</a:t>
+            </a:r>
+          </a:p>
+        </p:txBody>
+      </p:sp>
+      <p:pic>
+        <p:nvPicPr>
+          <p:cNvPr id="5" name="Content Placeholder 4">
+            <a:extLst>
+              <a:ext uri="{FF2B5EF4-FFF2-40B4-BE49-F238E27FC236}">
+                <a16:creationId xmlns:a16="http://schemas.microsoft.com/office/drawing/2014/main" id="{F2E0AD89-FB60-D9F1-5041-7836F85B975D}"/>
+              </a:ext>
+            </a:extLst>
+          </p:cNvPr>
+          <p:cNvPicPr>
+            <a:picLocks noGrp="1" noChangeAspect="1"/>
+          </p:cNvPicPr>
+          <p:nvPr>
+            <p:ph idx="1"/>
+          </p:nvPr>
+        </p:nvPicPr>
+        <p:blipFill>
+          <a:blip r:embed="rId2"/>
+          <a:stretch>
+            <a:fillRect/>
+          </a:stretch>
+        </p:blipFill>
+        <p:spPr>
+          <a:xfrm>
+            <a:off x="2330583" y="1423358"/>
+            <a:ext cx="7857213" cy="4794610"/>
+          </a:xfrm>
+        </p:spPr>
+      </p:pic>
+    </p:spTree>
+    <p:extLst>
+      <p:ext uri="{BB962C8B-B14F-4D97-AF65-F5344CB8AC3E}">
+        <p14:creationId xmlns:p14="http://schemas.microsoft.com/office/powerpoint/2010/main" val="3972118626"/>
+      </p:ext>
+    </p:extLst>
+  </p:cSld>
+  <p:clrMapOvr>
+    <a:masterClrMapping/>
+  </p:clrMapOvr>
+</p:sld>
+</file>
+
+<file path=ppt/slides/slide4.xml><?xml version="1.0" encoding="utf-8"?>
+<p:sld xmlns:a="http://schemas.openxmlformats.org/drawingml/2006/main" xmlns:r="http://schemas.openxmlformats.org/officeDocument/2006/relationships" xmlns:p="http://schemas.openxmlformats.org/presentationml/2006/main">
+  <p:cSld>
+    <p:spTree>
+      <p:nvGrpSpPr>
+        <p:cNvPr id="1" name=""/>
+        <p:cNvGrpSpPr/>
+        <p:nvPr/>
+      </p:nvGrpSpPr>
+      <p:grpSpPr>
+        <a:xfrm>
+          <a:off x="0" y="0"/>
+          <a:ext cx="0" cy="0"/>
+          <a:chOff x="0" y="0"/>
+          <a:chExt cx="0" cy="0"/>
+        </a:xfrm>
+      </p:grpSpPr>
+      <p:sp>
+        <p:nvSpPr>
+          <p:cNvPr id="2" name="Title 1">
+            <a:extLst>
+              <a:ext uri="{FF2B5EF4-FFF2-40B4-BE49-F238E27FC236}">
+                <a16:creationId xmlns:a16="http://schemas.microsoft.com/office/drawing/2014/main" id="{6237DD1D-8355-BEBF-3AE8-FD5D7D021C67}"/>
+              </a:ext>
+            </a:extLst>
+          </p:cNvPr>
+          <p:cNvSpPr>
+            <a:spLocks noGrp="1"/>
+          </p:cNvSpPr>
+          <p:nvPr>
+            <p:ph type="title"/>
+          </p:nvPr>
+        </p:nvSpPr>
+        <p:spPr/>
+        <p:txBody>
+          <a:bodyPr/>
+          <a:lstStyle/>
+          <a:p>
+            <a:r>
+              <a:rPr lang="en-US" dirty="0"/>
+              <a:t>Current 2017 Policies Study (cont..)</a:t>
+            </a:r>
+          </a:p>
+        </p:txBody>
+      </p:sp>
+      <p:sp>
+        <p:nvSpPr>
+          <p:cNvPr id="3" name="Content Placeholder 2">
+            <a:extLst>
+              <a:ext uri="{FF2B5EF4-FFF2-40B4-BE49-F238E27FC236}">
+                <a16:creationId xmlns:a16="http://schemas.microsoft.com/office/drawing/2014/main" id="{C10C3B92-D002-DA2E-B2D6-272BED1CBE07}"/>
+              </a:ext>
+            </a:extLst>
+          </p:cNvPr>
+          <p:cNvSpPr>
+            <a:spLocks noGrp="1"/>
+          </p:cNvSpPr>
+          <p:nvPr>
+            <p:ph idx="1"/>
+          </p:nvPr>
+        </p:nvSpPr>
+        <p:spPr>
+          <a:xfrm>
+            <a:off x="457199" y="1613140"/>
+            <a:ext cx="11162581" cy="4330459"/>
+          </a:xfrm>
+        </p:spPr>
+        <p:txBody>
+          <a:bodyPr/>
+          <a:lstStyle/>
+          <a:p>
+            <a:r>
+              <a:rPr lang="en-US" dirty="0"/>
+              <a:t>Goal: Identifying low-risk policy/group characteristics.</a:t>
+            </a:r>
+          </a:p>
+          <a:p>
+            <a:r>
+              <a:rPr lang="en-US" dirty="0"/>
+              <a:t>2017 Policy Data studied to identify low and high-risk groups and apply the same to 2018 Potential Policy data.</a:t>
+            </a:r>
+          </a:p>
+          <a:p>
+            <a:r>
+              <a:rPr lang="en-US" dirty="0"/>
+              <a:t>EDA (Exploratory Data Analysis) study aided by certain data groupings:</a:t>
+            </a:r>
+          </a:p>
+          <a:p>
+            <a:pPr lvl="1"/>
+            <a:r>
+              <a:rPr lang="en-US" dirty="0"/>
+              <a:t>Claim Risk Groups</a:t>
+            </a:r>
+          </a:p>
+          <a:p>
+            <a:pPr lvl="2"/>
+            <a:r>
+              <a:rPr lang="en-US" dirty="0"/>
+              <a:t>Low Risk: 0 claims</a:t>
+            </a:r>
+          </a:p>
+          <a:p>
+            <a:pPr lvl="2"/>
+            <a:r>
+              <a:rPr lang="en-US" dirty="0"/>
+              <a:t>High Risk: &gt;0 claims</a:t>
+            </a:r>
+          </a:p>
+          <a:p>
+            <a:pPr lvl="1"/>
+            <a:r>
+              <a:rPr lang="en-US" dirty="0"/>
+              <a:t>Credit Risk Groups</a:t>
+            </a:r>
+          </a:p>
+          <a:p>
+            <a:pPr lvl="2"/>
+            <a:r>
+              <a:rPr lang="en-US" dirty="0"/>
+              <a:t>Based on credit scores: Excellent, Good, Fair, etc.</a:t>
+            </a:r>
+          </a:p>
+          <a:p>
+            <a:r>
+              <a:rPr lang="en-US" dirty="0"/>
+              <a:t>Study is also accompanied by data modeling to add risk categories for 2018 potential data.</a:t>
+            </a:r>
+          </a:p>
+          <a:p>
+            <a:pPr lvl="2"/>
+            <a:endParaRPr lang="en-US" dirty="0"/>
+          </a:p>
+        </p:txBody>
+      </p:sp>
+    </p:spTree>
+    <p:extLst>
+      <p:ext uri="{BB962C8B-B14F-4D97-AF65-F5344CB8AC3E}">
+        <p14:creationId xmlns:p14="http://schemas.microsoft.com/office/powerpoint/2010/main" val="4199014137"/>
+      </p:ext>
+    </p:extLst>
+  </p:cSld>
+  <p:clrMapOvr>
+    <a:masterClrMapping/>
+  </p:clrMapOvr>
+</p:sld>
+</file>
+
+<file path=ppt/slides/slide40.xml><?xml version="1.0" encoding="utf-8"?>
 <p:sld xmlns:a="http://schemas.openxmlformats.org/drawingml/2006/main" xmlns:r="http://schemas.openxmlformats.org/officeDocument/2006/relationships" xmlns:p="http://schemas.openxmlformats.org/presentationml/2006/main">
   <p:cSld>
     <p:spTree>
@@ -8571,7 +10679,7 @@
 </p:sld>
 </file>
 
-<file path=ppt/slides/slide4.xml><?xml version="1.0" encoding="utf-8"?>
+<file path=ppt/slides/slide41.xml><?xml version="1.0" encoding="utf-8"?>
 <p:sld xmlns:a="http://schemas.openxmlformats.org/drawingml/2006/main" xmlns:r="http://schemas.openxmlformats.org/officeDocument/2006/relationships" xmlns:p="http://schemas.openxmlformats.org/presentationml/2006/main">
   <p:cSld>
     <p:spTree>
@@ -8593,7 +10701,7 @@
           <p:cNvPr id="2" name="Title 1">
             <a:extLst>
               <a:ext uri="{FF2B5EF4-FFF2-40B4-BE49-F238E27FC236}">
-                <a16:creationId xmlns:a16="http://schemas.microsoft.com/office/drawing/2014/main" id="{6237DD1D-8355-BEBF-3AE8-FD5D7D021C67}"/>
+                <a16:creationId xmlns:a16="http://schemas.microsoft.com/office/drawing/2014/main" id="{87BA2D2F-FBD5-E781-588D-584066AE1C6E}"/>
               </a:ext>
             </a:extLst>
           </p:cNvPr>
@@ -8601,7 +10709,7 @@
             <a:spLocks noGrp="1"/>
           </p:cNvSpPr>
           <p:nvPr>
-            <p:ph type="title"/>
+            <p:ph type="ctrTitle"/>
           </p:nvPr>
         </p:nvSpPr>
         <p:spPr/>
@@ -8611,105 +10719,15 @@
           <a:p>
             <a:r>
               <a:rPr lang="en-US" dirty="0"/>
-              <a:t>Current 2017 Policies Study (cont..)</a:t>
-            </a:r>
-          </a:p>
-        </p:txBody>
-      </p:sp>
-      <p:sp>
-        <p:nvSpPr>
-          <p:cNvPr id="3" name="Content Placeholder 2">
-            <a:extLst>
-              <a:ext uri="{FF2B5EF4-FFF2-40B4-BE49-F238E27FC236}">
-                <a16:creationId xmlns:a16="http://schemas.microsoft.com/office/drawing/2014/main" id="{C10C3B92-D002-DA2E-B2D6-272BED1CBE07}"/>
-              </a:ext>
-            </a:extLst>
-          </p:cNvPr>
-          <p:cNvSpPr>
-            <a:spLocks noGrp="1"/>
-          </p:cNvSpPr>
-          <p:nvPr>
-            <p:ph idx="1"/>
-          </p:nvPr>
-        </p:nvSpPr>
-        <p:spPr>
-          <a:xfrm>
-            <a:off x="457199" y="1613140"/>
-            <a:ext cx="11162581" cy="4330459"/>
-          </a:xfrm>
-        </p:spPr>
-        <p:txBody>
-          <a:bodyPr/>
-          <a:lstStyle/>
-          <a:p>
-            <a:r>
-              <a:rPr lang="en-US" dirty="0"/>
-              <a:t>Goal: Identifying low-risk policy/group characteristics.</a:t>
-            </a:r>
-          </a:p>
-          <a:p>
-            <a:r>
-              <a:rPr lang="en-US" dirty="0"/>
-              <a:t>2017 Policy Data studied to identify low and high-risk groups and apply the same to 2018 Potential Policy data.</a:t>
-            </a:r>
-          </a:p>
-          <a:p>
-            <a:r>
-              <a:rPr lang="en-US" dirty="0"/>
-              <a:t>EDA (Exploratory Data Analysis) study aided by certain data groupings:</a:t>
-            </a:r>
-          </a:p>
-          <a:p>
-            <a:pPr lvl="1"/>
-            <a:r>
-              <a:rPr lang="en-US" dirty="0"/>
-              <a:t>Claim Risk Groups</a:t>
-            </a:r>
-          </a:p>
-          <a:p>
-            <a:pPr lvl="2"/>
-            <a:r>
-              <a:rPr lang="en-US" dirty="0"/>
-              <a:t>Low Risk: 0 claims</a:t>
-            </a:r>
-          </a:p>
-          <a:p>
-            <a:pPr lvl="2"/>
-            <a:r>
-              <a:rPr lang="en-US" dirty="0"/>
-              <a:t>High Risk: &gt;0 claims</a:t>
-            </a:r>
-          </a:p>
-          <a:p>
-            <a:pPr lvl="1"/>
-            <a:r>
-              <a:rPr lang="en-US" dirty="0"/>
-              <a:t>Credit Risk Groups</a:t>
-            </a:r>
-          </a:p>
-          <a:p>
-            <a:pPr lvl="2"/>
-            <a:r>
-              <a:rPr lang="en-US" dirty="0"/>
-              <a:t>Based on credit scores: Excellent, Good, Fair, etc.</a:t>
-            </a:r>
-          </a:p>
-          <a:p>
-            <a:r>
-              <a:rPr lang="en-US" dirty="0"/>
-              <a:t>Study is also accompanied by data modeling to add risk categories for 2018 potential data.</a:t>
-            </a:r>
-          </a:p>
-          <a:p>
-            <a:pPr lvl="2"/>
-            <a:endParaRPr lang="en-US" dirty="0"/>
+              <a:t>Thank you!</a:t>
+            </a:r>
           </a:p>
         </p:txBody>
       </p:sp>
     </p:spTree>
     <p:extLst>
       <p:ext uri="{BB962C8B-B14F-4D97-AF65-F5344CB8AC3E}">
-        <p14:creationId xmlns:p14="http://schemas.microsoft.com/office/powerpoint/2010/main" val="4199014137"/>
+        <p14:creationId xmlns:p14="http://schemas.microsoft.com/office/powerpoint/2010/main" val="2555217564"/>
       </p:ext>
     </p:extLst>
   </p:cSld>
@@ -10192,6 +12210,26 @@
 </file>
 
 <file path=customXml/item1.xml><?xml version="1.0" encoding="utf-8"?>
+<p:properties xmlns:p="http://schemas.microsoft.com/office/2006/metadata/properties" xmlns:xsi="http://www.w3.org/2001/XMLSchema-instance" xmlns:pc="http://schemas.microsoft.com/office/infopath/2007/PartnerControls">
+  <documentManagement>
+    <VSO_x0020_item_x0020_id xmlns="40262f94-9f35-4ac3-9a90-690165a166b7" xsi:nil="true"/>
+    <Assetid_x0020_ xmlns="40262f94-9f35-4ac3-9a90-690165a166b7" xsi:nil="true"/>
+    <Item_x0020_Details xmlns="40262f94-9f35-4ac3-9a90-690165a166b7" xsi:nil="true"/>
+    <Template_x0020_details xmlns="40262f94-9f35-4ac3-9a90-690165a166b7" xsi:nil="true"/>
+  </documentManagement>
+</p:properties>
+</file>
+
+<file path=customXml/item2.xml><?xml version="1.0" encoding="utf-8"?>
+<?mso-contentType ?>
+<FormTemplates xmlns="http://schemas.microsoft.com/sharepoint/v3/contenttype/forms">
+  <Display>DocumentLibraryForm</Display>
+  <Edit>DocumentLibraryForm</Edit>
+  <New>DocumentLibraryForm</New>
+</FormTemplates>
+</file>
+
+<file path=customXml/item3.xml><?xml version="1.0" encoding="utf-8"?>
 <ct:contentTypeSchema xmlns:ct="http://schemas.microsoft.com/office/2006/metadata/contentType" xmlns:ma="http://schemas.microsoft.com/office/2006/metadata/properties/metaAttributes" ct:_="" ma:_="" ma:contentTypeName="Document" ma:contentTypeID="0x010100AA3F7D94069FF64A86F7DFF56D60E3BE" ma:contentTypeVersion="6" ma:contentTypeDescription="Create a new document." ma:contentTypeScope="" ma:versionID="c32302c77d4085ecf495bdddb7f5e889">
   <xsd:schema xmlns:xsd="http://www.w3.org/2001/XMLSchema" xmlns:xs="http://www.w3.org/2001/XMLSchema" xmlns:p="http://schemas.microsoft.com/office/2006/metadata/properties" xmlns:ns2="a4f35948-e619-41b3-aa29-22878b09cfd2" xmlns:ns3="40262f94-9f35-4ac3-9a90-690165a166b7" targetNamespace="http://schemas.microsoft.com/office/2006/metadata/properties" ma:root="true" ma:fieldsID="4ab5ae46be95f9d0be6107e8200be7a2" ns2:_="" ns3:_="">
     <xsd:import namespace="a4f35948-e619-41b3-aa29-22878b09cfd2"/>
@@ -10372,27 +12410,32 @@
 </ct:contentTypeSchema>
 </file>
 
-<file path=customXml/item2.xml><?xml version="1.0" encoding="utf-8"?>
-<?mso-contentType ?>
-<FormTemplates xmlns="http://schemas.microsoft.com/sharepoint/v3/contenttype/forms">
-  <Display>DocumentLibraryForm</Display>
-  <Edit>DocumentLibraryForm</Edit>
-  <New>DocumentLibraryForm</New>
-</FormTemplates>
+<file path=customXml/itemProps1.xml><?xml version="1.0" encoding="utf-8"?>
+<ds:datastoreItem xmlns:ds="http://schemas.openxmlformats.org/officeDocument/2006/customXml" ds:itemID="{2A1BD8E5-A18E-435C-B431-90A6B59F4B6F}">
+  <ds:schemaRefs>
+    <ds:schemaRef ds:uri="http://purl.org/dc/elements/1.1/"/>
+    <ds:schemaRef ds:uri="http://schemas.microsoft.com/office/2006/metadata/properties"/>
+    <ds:schemaRef ds:uri="http://purl.org/dc/terms/"/>
+    <ds:schemaRef ds:uri="http://schemas.openxmlformats.org/package/2006/metadata/core-properties"/>
+    <ds:schemaRef ds:uri="http://schemas.microsoft.com/office/2006/documentManagement/types"/>
+    <ds:schemaRef ds:uri="http://schemas.microsoft.com/office/infopath/2007/PartnerControls"/>
+    <ds:schemaRef ds:uri="40262f94-9f35-4ac3-9a90-690165a166b7"/>
+    <ds:schemaRef ds:uri="a4f35948-e619-41b3-aa29-22878b09cfd2"/>
+    <ds:schemaRef ds:uri="http://www.w3.org/XML/1998/namespace"/>
+    <ds:schemaRef ds:uri="http://purl.org/dc/dcmitype/"/>
+  </ds:schemaRefs>
+</ds:datastoreItem>
 </file>
 
-<file path=customXml/item3.xml><?xml version="1.0" encoding="utf-8"?>
-<p:properties xmlns:p="http://schemas.microsoft.com/office/2006/metadata/properties" xmlns:xsi="http://www.w3.org/2001/XMLSchema-instance" xmlns:pc="http://schemas.microsoft.com/office/infopath/2007/PartnerControls">
-  <documentManagement>
-    <VSO_x0020_item_x0020_id xmlns="40262f94-9f35-4ac3-9a90-690165a166b7" xsi:nil="true"/>
-    <Assetid_x0020_ xmlns="40262f94-9f35-4ac3-9a90-690165a166b7" xsi:nil="true"/>
-    <Item_x0020_Details xmlns="40262f94-9f35-4ac3-9a90-690165a166b7" xsi:nil="true"/>
-    <Template_x0020_details xmlns="40262f94-9f35-4ac3-9a90-690165a166b7" xsi:nil="true"/>
-  </documentManagement>
-</p:properties>
+<file path=customXml/itemProps2.xml><?xml version="1.0" encoding="utf-8"?>
+<ds:datastoreItem xmlns:ds="http://schemas.openxmlformats.org/officeDocument/2006/customXml" ds:itemID="{05EEE0F9-7BC9-4998-8617-7CC115AD97E2}">
+  <ds:schemaRefs>
+    <ds:schemaRef ds:uri="http://schemas.microsoft.com/sharepoint/v3/contenttype/forms"/>
+  </ds:schemaRefs>
+</ds:datastoreItem>
 </file>
 
-<file path=customXml/itemProps1.xml><?xml version="1.0" encoding="utf-8"?>
+<file path=customXml/itemProps3.xml><?xml version="1.0" encoding="utf-8"?>
 <ds:datastoreItem xmlns:ds="http://schemas.openxmlformats.org/officeDocument/2006/customXml" ds:itemID="{4BEBB951-DE64-4CB8-9E1C-184A357AD7FD}">
   <ds:schemaRefs>
     <ds:schemaRef ds:uri="http://schemas.microsoft.com/office/2006/metadata/contentType"/>
@@ -10409,29 +12452,4 @@
     <ds:schemaRef ds:uri="http://schemas.microsoft.com/internal/obd"/>
   </ds:schemaRefs>
 </ds:datastoreItem>
-</file>
-
-<file path=customXml/itemProps2.xml><?xml version="1.0" encoding="utf-8"?>
-<ds:datastoreItem xmlns:ds="http://schemas.openxmlformats.org/officeDocument/2006/customXml" ds:itemID="{05EEE0F9-7BC9-4998-8617-7CC115AD97E2}">
-  <ds:schemaRefs>
-    <ds:schemaRef ds:uri="http://schemas.microsoft.com/sharepoint/v3/contenttype/forms"/>
-  </ds:schemaRefs>
-</ds:datastoreItem>
-</file>
-
-<file path=customXml/itemProps3.xml><?xml version="1.0" encoding="utf-8"?>
-<ds:datastoreItem xmlns:ds="http://schemas.openxmlformats.org/officeDocument/2006/customXml" ds:itemID="{2A1BD8E5-A18E-435C-B431-90A6B59F4B6F}">
-  <ds:schemaRefs>
-    <ds:schemaRef ds:uri="http://purl.org/dc/elements/1.1/"/>
-    <ds:schemaRef ds:uri="http://schemas.microsoft.com/office/2006/metadata/properties"/>
-    <ds:schemaRef ds:uri="http://purl.org/dc/terms/"/>
-    <ds:schemaRef ds:uri="http://schemas.openxmlformats.org/package/2006/metadata/core-properties"/>
-    <ds:schemaRef ds:uri="http://schemas.microsoft.com/office/2006/documentManagement/types"/>
-    <ds:schemaRef ds:uri="http://schemas.microsoft.com/office/infopath/2007/PartnerControls"/>
-    <ds:schemaRef ds:uri="40262f94-9f35-4ac3-9a90-690165a166b7"/>
-    <ds:schemaRef ds:uri="a4f35948-e619-41b3-aa29-22878b09cfd2"/>
-    <ds:schemaRef ds:uri="http://www.w3.org/XML/1998/namespace"/>
-    <ds:schemaRef ds:uri="http://purl.org/dc/dcmitype/"/>
-  </ds:schemaRefs>
-</ds:datastoreItem>
 </file>
</xml_diff>